<commit_message>
Update slides, removing unused backup slides
</commit_message>
<xml_diff>
--- a/content/papers/socc12-cake-slides-awang.pptx
+++ b/content/papers/socc12-cake-slides-awang.pptx
@@ -6,7 +6,7 @@
     <p:sldMasterId id="2147483663" r:id="rId2"/>
   </p:sldMasterIdLst>
   <p:notesMasterIdLst>
-    <p:notesMasterId r:id="rId74"/>
+    <p:notesMasterId r:id="rId65"/>
   </p:notesMasterIdLst>
   <p:sldIdLst>
     <p:sldId id="256" r:id="rId3"/>
@@ -69,17 +69,8 @@
     <p:sldId id="335" r:id="rId60"/>
     <p:sldId id="361" r:id="rId61"/>
     <p:sldId id="315" r:id="rId62"/>
-    <p:sldId id="351" r:id="rId63"/>
-    <p:sldId id="359" r:id="rId64"/>
-    <p:sldId id="360" r:id="rId65"/>
-    <p:sldId id="386" r:id="rId66"/>
-    <p:sldId id="387" r:id="rId67"/>
-    <p:sldId id="388" r:id="rId68"/>
-    <p:sldId id="389" r:id="rId69"/>
-    <p:sldId id="390" r:id="rId70"/>
-    <p:sldId id="391" r:id="rId71"/>
-    <p:sldId id="392" r:id="rId72"/>
-    <p:sldId id="397" r:id="rId73"/>
+    <p:sldId id="359" r:id="rId63"/>
+    <p:sldId id="360" r:id="rId64"/>
   </p:sldIdLst>
   <p:sldSz cx="9144000" cy="6858000" type="screen4x3"/>
   <p:notesSz cx="6858000" cy="9144000"/>
@@ -263,7 +254,7 @@
           <a:p>
             <a:fld id="{A240CA51-06A8-445E-BAC3-4A76B912B381}" type="datetimeFigureOut">
               <a:rPr lang="en-US" smtClean="0"/>
-              <a:t>10/15/2012</a:t>
+              <a:t>10/17/2012</a:t>
             </a:fld>
             <a:endParaRPr lang="en-US"/>
           </a:p>
@@ -786,94 +777,6 @@
     <p:extLst>
       <p:ext uri="{BB962C8B-B14F-4D97-AF65-F5344CB8AC3E}">
         <p14:creationId xmlns:p14="http://schemas.microsoft.com/office/powerpoint/2010/main" val="3507392168"/>
-      </p:ext>
-    </p:extLst>
-  </p:cSld>
-  <p:clrMapOvr>
-    <a:masterClrMapping/>
-  </p:clrMapOvr>
-</p:notes>
-</file>
-
-<file path=ppt/notesSlides/notesSlide4.xml><?xml version="1.0" encoding="utf-8"?>
-<p:notes xmlns:a="http://schemas.openxmlformats.org/drawingml/2006/main" xmlns:r="http://schemas.openxmlformats.org/officeDocument/2006/relationships" xmlns:p="http://schemas.openxmlformats.org/presentationml/2006/main">
-  <p:cSld>
-    <p:spTree>
-      <p:nvGrpSpPr>
-        <p:cNvPr id="1" name=""/>
-        <p:cNvGrpSpPr/>
-        <p:nvPr/>
-      </p:nvGrpSpPr>
-      <p:grpSpPr>
-        <a:xfrm>
-          <a:off x="0" y="0"/>
-          <a:ext cx="0" cy="0"/>
-          <a:chOff x="0" y="0"/>
-          <a:chExt cx="0" cy="0"/>
-        </a:xfrm>
-      </p:grpSpPr>
-      <p:sp>
-        <p:nvSpPr>
-          <p:cNvPr id="2" name="Slide Image Placeholder 1"/>
-          <p:cNvSpPr>
-            <a:spLocks noGrp="1" noRot="1" noChangeAspect="1"/>
-          </p:cNvSpPr>
-          <p:nvPr>
-            <p:ph type="sldImg"/>
-          </p:nvPr>
-        </p:nvSpPr>
-        <p:spPr/>
-      </p:sp>
-      <p:sp>
-        <p:nvSpPr>
-          <p:cNvPr id="3" name="Notes Placeholder 2"/>
-          <p:cNvSpPr>
-            <a:spLocks noGrp="1"/>
-          </p:cNvSpPr>
-          <p:nvPr>
-            <p:ph type="body" idx="1"/>
-          </p:nvPr>
-        </p:nvSpPr>
-        <p:spPr/>
-        <p:txBody>
-          <a:bodyPr/>
-          <a:lstStyle/>
-          <a:p>
-            <a:r>
-              <a:rPr lang="en-US" dirty="0" smtClean="0"/>
-              <a:t>Fix the legend: Separated &amp; Consolidated</a:t>
-            </a:r>
-            <a:endParaRPr lang="en-US" dirty="0"/>
-          </a:p>
-        </p:txBody>
-      </p:sp>
-      <p:sp>
-        <p:nvSpPr>
-          <p:cNvPr id="4" name="Slide Number Placeholder 3"/>
-          <p:cNvSpPr>
-            <a:spLocks noGrp="1"/>
-          </p:cNvSpPr>
-          <p:nvPr>
-            <p:ph type="sldNum" sz="quarter" idx="10"/>
-          </p:nvPr>
-        </p:nvSpPr>
-        <p:spPr/>
-        <p:txBody>
-          <a:bodyPr/>
-          <a:lstStyle/>
-          <a:p>
-            <a:fld id="{0568AE71-45FA-4445-B7F4-1A3520DF6E5F}" type="slidenum">
-              <a:rPr lang="en-US" smtClean="0"/>
-              <a:t>71</a:t>
-            </a:fld>
-            <a:endParaRPr lang="en-US"/>
-          </a:p>
-        </p:txBody>
-      </p:sp>
-    </p:spTree>
-    <p:extLst>
-      <p:ext uri="{BB962C8B-B14F-4D97-AF65-F5344CB8AC3E}">
-        <p14:creationId xmlns:p14="http://schemas.microsoft.com/office/powerpoint/2010/main" val="2962086754"/>
       </p:ext>
     </p:extLst>
   </p:cSld>
@@ -8058,11 +7961,6 @@
               </a:rPr>
               <a:t>Privacy</a:t>
             </a:r>
-            <a:endParaRPr lang="en-US" sz="4000" dirty="0" smtClean="0">
-              <a:solidFill>
-                <a:schemeClr val="bg2"/>
-              </a:solidFill>
-            </a:endParaRPr>
           </a:p>
           <a:p>
             <a:r>
@@ -51898,215 +51796,42 @@
           <a:lstStyle/>
           <a:p>
             <a:r>
-              <a:rPr lang="en-US" dirty="0" smtClean="0"/>
-              <a:t>2</a:t>
+              <a:rPr lang="en-US" sz="5400" dirty="0" smtClean="0"/>
+              <a:t>Limit Outstanding Requests</a:t>
             </a:r>
-            <a:r>
-              <a:rPr lang="en-US" baseline="30000" dirty="0" smtClean="0"/>
-              <a:t>nd</a:t>
-            </a:r>
-            <a:r>
-              <a:rPr lang="en-US" dirty="0" smtClean="0"/>
-              <a:t>-level Scheduling</a:t>
-            </a:r>
-            <a:endParaRPr lang="en-US" dirty="0"/>
+            <a:endParaRPr lang="en-US" sz="5400" dirty="0"/>
           </a:p>
         </p:txBody>
       </p:sp>
-      <p:graphicFrame>
-        <p:nvGraphicFramePr>
+      <p:pic>
+        <p:nvPicPr>
           <p:cNvPr id="5" name="Content Placeholder 4"/>
-          <p:cNvGraphicFramePr>
-            <a:graphicFrameLocks noGrp="1"/>
-          </p:cNvGraphicFramePr>
+          <p:cNvPicPr>
+            <a:picLocks noGrp="1" noChangeAspect="1"/>
+          </p:cNvPicPr>
           <p:nvPr>
             <p:ph idx="1"/>
-            <p:extLst>
-              <p:ext uri="{D42A27DB-BD31-4B8C-83A1-F6EECF244321}">
-                <p14:modId xmlns:p14="http://schemas.microsoft.com/office/powerpoint/2010/main" val="3258029821"/>
-              </p:ext>
-            </p:extLst>
           </p:nvPr>
-        </p:nvGraphicFramePr>
-        <p:xfrm>
-          <a:off x="457200" y="2011680"/>
-          <a:ext cx="8229600" cy="1371600"/>
-        </p:xfrm>
-        <a:graphic>
-          <a:graphicData uri="http://schemas.openxmlformats.org/drawingml/2006/table">
-            <a:tbl>
-              <a:tblPr firstRow="1" bandRow="1">
-                <a:tableStyleId>{5C22544A-7EE6-4342-B048-85BDC9FD1C3A}</a:tableStyleId>
-              </a:tblPr>
-              <a:tblGrid>
-                <a:gridCol w="2438400"/>
-                <a:gridCol w="2590800"/>
-                <a:gridCol w="3200400"/>
-              </a:tblGrid>
-              <a:tr h="370840">
-                <a:tc>
-                  <a:txBody>
-                    <a:bodyPr/>
-                    <a:lstStyle/>
-                    <a:p>
-                      <a:r>
-                        <a:rPr lang="en-US" sz="2400" dirty="0" smtClean="0"/>
-                        <a:t>SLO </a:t>
-                      </a:r>
-                      <a:r>
-                        <a:rPr lang="en-US" sz="2400" dirty="0" err="1" smtClean="0"/>
-                        <a:t>perf</a:t>
-                      </a:r>
-                      <a:endParaRPr lang="en-US" sz="2400" dirty="0"/>
-                    </a:p>
-                  </a:txBody>
-                  <a:tcPr/>
-                </a:tc>
-                <a:tc>
-                  <a:txBody>
-                    <a:bodyPr/>
-                    <a:lstStyle/>
-                    <a:p>
-                      <a:r>
-                        <a:rPr lang="en-US" sz="2400" dirty="0" smtClean="0"/>
-                        <a:t>Action</a:t>
-                      </a:r>
-                      <a:endParaRPr lang="en-US" sz="2400" dirty="0"/>
-                    </a:p>
-                  </a:txBody>
-                  <a:tcPr/>
-                </a:tc>
-                <a:tc>
-                  <a:txBody>
-                    <a:bodyPr/>
-                    <a:lstStyle/>
-                    <a:p>
-                      <a:r>
-                        <a:rPr lang="en-US" sz="2400" dirty="0" smtClean="0"/>
-                        <a:t>Justification</a:t>
-                      </a:r>
-                      <a:endParaRPr lang="en-US" sz="2400" dirty="0"/>
-                    </a:p>
-                  </a:txBody>
-                  <a:tcPr/>
-                </a:tc>
-              </a:tr>
-              <a:tr h="370840">
-                <a:tc>
-                  <a:txBody>
-                    <a:bodyPr/>
-                    <a:lstStyle/>
-                    <a:p>
-                      <a:r>
-                        <a:rPr lang="en-US" sz="2400" dirty="0" err="1" smtClean="0"/>
-                        <a:t>perf</a:t>
-                      </a:r>
-                      <a:r>
-                        <a:rPr lang="en-US" sz="2400" dirty="0" smtClean="0"/>
-                        <a:t> &gt;&gt; SLO</a:t>
-                      </a:r>
-                      <a:endParaRPr lang="en-US" sz="2400" dirty="0"/>
-                    </a:p>
-                  </a:txBody>
-                  <a:tcPr/>
-                </a:tc>
-                <a:tc>
-                  <a:txBody>
-                    <a:bodyPr/>
-                    <a:lstStyle/>
-                    <a:p>
-                      <a:r>
-                        <a:rPr lang="en-US" sz="2400" dirty="0" smtClean="0">
-                          <a:sym typeface="Symbol"/>
-                        </a:rPr>
-                        <a:t> </a:t>
-                      </a:r>
-                      <a:r>
-                        <a:rPr lang="en-US" sz="2400" dirty="0" smtClean="0"/>
-                        <a:t>HDFS</a:t>
-                      </a:r>
-                      <a:r>
-                        <a:rPr lang="en-US" sz="2400" baseline="0" dirty="0" smtClean="0"/>
-                        <a:t> allocation</a:t>
-                      </a:r>
-                      <a:endParaRPr lang="en-US" sz="2400" dirty="0"/>
-                    </a:p>
-                  </a:txBody>
-                  <a:tcPr/>
-                </a:tc>
-                <a:tc>
-                  <a:txBody>
-                    <a:bodyPr/>
-                    <a:lstStyle/>
-                    <a:p>
-                      <a:r>
-                        <a:rPr lang="en-US" sz="2400" dirty="0" smtClean="0"/>
-                        <a:t>SLO safely met</a:t>
-                      </a:r>
-                      <a:endParaRPr lang="en-US" sz="2400" dirty="0"/>
-                    </a:p>
-                  </a:txBody>
-                  <a:tcPr/>
-                </a:tc>
-              </a:tr>
-              <a:tr h="370840">
-                <a:tc>
-                  <a:txBody>
-                    <a:bodyPr/>
-                    <a:lstStyle/>
-                    <a:p>
-                      <a:r>
-                        <a:rPr lang="en-US" sz="2400" dirty="0" err="1" smtClean="0"/>
-                        <a:t>perf</a:t>
-                      </a:r>
-                      <a:r>
-                        <a:rPr lang="en-US" sz="2400" dirty="0" smtClean="0"/>
-                        <a:t> &lt; SLO</a:t>
-                      </a:r>
-                      <a:endParaRPr lang="en-US" sz="2400" dirty="0"/>
-                    </a:p>
-                  </a:txBody>
-                  <a:tcPr/>
-                </a:tc>
-                <a:tc>
-                  <a:txBody>
-                    <a:bodyPr/>
-                    <a:lstStyle/>
-                    <a:p>
-                      <a:r>
-                        <a:rPr lang="en-US" sz="2400" dirty="0" smtClean="0">
-                          <a:sym typeface="Symbol"/>
-                        </a:rPr>
-                        <a:t> </a:t>
-                      </a:r>
-                      <a:r>
-                        <a:rPr lang="en-US" sz="2400" dirty="0" smtClean="0"/>
-                        <a:t>HDFS allocation</a:t>
-                      </a:r>
-                      <a:endParaRPr lang="en-US" sz="2400" dirty="0"/>
-                    </a:p>
-                  </a:txBody>
-                  <a:tcPr/>
-                </a:tc>
-                <a:tc>
-                  <a:txBody>
-                    <a:bodyPr/>
-                    <a:lstStyle/>
-                    <a:p>
-                      <a:r>
-                        <a:rPr lang="en-US" sz="2400" dirty="0" smtClean="0"/>
-                        <a:t>SLO is not met</a:t>
-                      </a:r>
-                      <a:endParaRPr lang="en-US" sz="2400" dirty="0"/>
-                    </a:p>
-                  </a:txBody>
-                  <a:tcPr/>
-                </a:tc>
-              </a:tr>
-            </a:tbl>
-          </a:graphicData>
-        </a:graphic>
-      </p:graphicFrame>
+        </p:nvPicPr>
+        <p:blipFill>
+          <a:blip r:embed="rId2">
+            <a:extLst>
+              <a:ext uri="{28A0092B-C50C-407E-A947-70E740481C1C}">
+                <a14:useLocalDpi xmlns:a14="http://schemas.microsoft.com/office/drawing/2010/main" val="0"/>
+              </a:ext>
+            </a:extLst>
+          </a:blip>
+          <a:stretch>
+            <a:fillRect/>
+          </a:stretch>
+        </p:blipFill>
+        <p:spPr>
+          <a:xfrm>
+            <a:off x="457200" y="1914586"/>
+            <a:ext cx="8229600" cy="3897190"/>
+          </a:xfrm>
+        </p:spPr>
+      </p:pic>
       <p:sp>
         <p:nvSpPr>
           <p:cNvPr id="4" name="Slide Number Placeholder 3"/>
@@ -52122,7 +51847,7 @@
           <a:bodyPr/>
           <a:lstStyle/>
           <a:p>
-            <a:fld id="{318BA781-E589-4C61-8C8B-F5ECA1300D5B}" type="slidenum">
+            <a:fld id="{D3111AAA-2ECE-4969-9195-D9C506454076}" type="slidenum">
               <a:rPr lang="en-US" smtClean="0"/>
               <a:t>61</a:t>
             </a:fld>
@@ -52130,199 +51855,10 @@
           </a:p>
         </p:txBody>
       </p:sp>
-      <p:graphicFrame>
-        <p:nvGraphicFramePr>
-          <p:cNvPr id="6" name="Content Placeholder 4"/>
-          <p:cNvGraphicFramePr>
-            <a:graphicFrameLocks/>
-          </p:cNvGraphicFramePr>
-          <p:nvPr>
-            <p:extLst>
-              <p:ext uri="{D42A27DB-BD31-4B8C-83A1-F6EECF244321}">
-                <p14:modId xmlns:p14="http://schemas.microsoft.com/office/powerpoint/2010/main" val="1794988146"/>
-              </p:ext>
-            </p:extLst>
-          </p:nvPr>
-        </p:nvGraphicFramePr>
-        <p:xfrm>
-          <a:off x="457200" y="3886200"/>
-          <a:ext cx="8229600" cy="1371600"/>
-        </p:xfrm>
-        <a:graphic>
-          <a:graphicData uri="http://schemas.openxmlformats.org/drawingml/2006/table">
-            <a:tbl>
-              <a:tblPr firstRow="1" bandRow="1">
-                <a:tableStyleId>{5C22544A-7EE6-4342-B048-85BDC9FD1C3A}</a:tableStyleId>
-              </a:tblPr>
-              <a:tblGrid>
-                <a:gridCol w="2438400"/>
-                <a:gridCol w="2667000"/>
-                <a:gridCol w="3124200"/>
-              </a:tblGrid>
-              <a:tr h="370840">
-                <a:tc>
-                  <a:txBody>
-                    <a:bodyPr/>
-                    <a:lstStyle/>
-                    <a:p>
-                      <a:r>
-                        <a:rPr lang="en-US" sz="2400" dirty="0" smtClean="0"/>
-                        <a:t>Queue </a:t>
-                      </a:r>
-                      <a:r>
-                        <a:rPr lang="en-US" sz="2400" dirty="0" err="1" smtClean="0"/>
-                        <a:t>occ</a:t>
-                      </a:r>
-                      <a:endParaRPr lang="en-US" sz="2400" dirty="0"/>
-                    </a:p>
-                  </a:txBody>
-                  <a:tcPr/>
-                </a:tc>
-                <a:tc>
-                  <a:txBody>
-                    <a:bodyPr/>
-                    <a:lstStyle/>
-                    <a:p>
-                      <a:r>
-                        <a:rPr lang="en-US" sz="2400" dirty="0" smtClean="0"/>
-                        <a:t>Action</a:t>
-                      </a:r>
-                      <a:endParaRPr lang="en-US" sz="2400" dirty="0"/>
-                    </a:p>
-                  </a:txBody>
-                  <a:tcPr/>
-                </a:tc>
-                <a:tc>
-                  <a:txBody>
-                    <a:bodyPr/>
-                    <a:lstStyle/>
-                    <a:p>
-                      <a:r>
-                        <a:rPr lang="en-US" sz="2400" dirty="0" smtClean="0"/>
-                        <a:t>Justification</a:t>
-                      </a:r>
-                      <a:endParaRPr lang="en-US" sz="2400" dirty="0"/>
-                    </a:p>
-                  </a:txBody>
-                  <a:tcPr/>
-                </a:tc>
-              </a:tr>
-              <a:tr h="370840">
-                <a:tc>
-                  <a:txBody>
-                    <a:bodyPr/>
-                    <a:lstStyle/>
-                    <a:p>
-                      <a:r>
-                        <a:rPr lang="en-US" sz="2400" dirty="0" smtClean="0"/>
-                        <a:t>HBase</a:t>
-                      </a:r>
-                      <a:r>
-                        <a:rPr lang="en-US" sz="2400" baseline="0" dirty="0" smtClean="0"/>
-                        <a:t> &gt; HDFS</a:t>
-                      </a:r>
-                      <a:endParaRPr lang="en-US" sz="2400" dirty="0"/>
-                    </a:p>
-                  </a:txBody>
-                  <a:tcPr/>
-                </a:tc>
-                <a:tc>
-                  <a:txBody>
-                    <a:bodyPr/>
-                    <a:lstStyle/>
-                    <a:p>
-                      <a:r>
-                        <a:rPr lang="en-US" sz="2400" dirty="0" smtClean="0">
-                          <a:sym typeface="Symbol"/>
-                        </a:rPr>
-                        <a:t> </a:t>
-                      </a:r>
-                      <a:r>
-                        <a:rPr lang="en-US" sz="2400" dirty="0" smtClean="0"/>
-                        <a:t>HBase allocation</a:t>
-                      </a:r>
-                      <a:endParaRPr lang="en-US" sz="2400" dirty="0"/>
-                    </a:p>
-                  </a:txBody>
-                  <a:tcPr/>
-                </a:tc>
-                <a:tc>
-                  <a:txBody>
-                    <a:bodyPr/>
-                    <a:lstStyle/>
-                    <a:p>
-                      <a:r>
-                        <a:rPr lang="en-US" sz="2400" baseline="0" dirty="0" smtClean="0"/>
-                        <a:t>Bottlenecked on HBase</a:t>
-                      </a:r>
-                      <a:endParaRPr lang="en-US" sz="2400" dirty="0"/>
-                    </a:p>
-                  </a:txBody>
-                  <a:tcPr/>
-                </a:tc>
-              </a:tr>
-              <a:tr h="370840">
-                <a:tc>
-                  <a:txBody>
-                    <a:bodyPr/>
-                    <a:lstStyle/>
-                    <a:p>
-                      <a:r>
-                        <a:rPr lang="en-US" sz="2400" dirty="0" smtClean="0"/>
-                        <a:t>HBase</a:t>
-                      </a:r>
-                      <a:r>
-                        <a:rPr lang="en-US" sz="2400" baseline="0" dirty="0" smtClean="0"/>
-                        <a:t> &lt;&lt; HDFS</a:t>
-                      </a:r>
-                      <a:endParaRPr lang="en-US" sz="2400" dirty="0"/>
-                    </a:p>
-                  </a:txBody>
-                  <a:tcPr/>
-                </a:tc>
-                <a:tc>
-                  <a:txBody>
-                    <a:bodyPr/>
-                    <a:lstStyle/>
-                    <a:p>
-                      <a:r>
-                        <a:rPr lang="en-US" sz="2400" dirty="0" smtClean="0">
-                          <a:sym typeface="Symbol"/>
-                        </a:rPr>
-                        <a:t></a:t>
-                      </a:r>
-                      <a:r>
-                        <a:rPr lang="en-US" sz="2400" dirty="0" smtClean="0"/>
-                        <a:t> HBase allocation</a:t>
-                      </a:r>
-                      <a:endParaRPr lang="en-US" sz="2400" dirty="0"/>
-                    </a:p>
-                  </a:txBody>
-                  <a:tcPr/>
-                </a:tc>
-                <a:tc>
-                  <a:txBody>
-                    <a:bodyPr/>
-                    <a:lstStyle/>
-                    <a:p>
-                      <a:r>
-                        <a:rPr lang="en-US" sz="2400" dirty="0" smtClean="0"/>
-                        <a:t>HBase is underutilized</a:t>
-                      </a:r>
-                      <a:endParaRPr lang="en-US" sz="2400" dirty="0"/>
-                    </a:p>
-                  </a:txBody>
-                  <a:tcPr/>
-                </a:tc>
-              </a:tr>
-            </a:tbl>
-          </a:graphicData>
-        </a:graphic>
-      </p:graphicFrame>
     </p:spTree>
     <p:extLst>
       <p:ext uri="{BB962C8B-B14F-4D97-AF65-F5344CB8AC3E}">
-        <p14:creationId xmlns:p14="http://schemas.microsoft.com/office/powerpoint/2010/main" val="689336215"/>
+        <p14:creationId xmlns:p14="http://schemas.microsoft.com/office/powerpoint/2010/main" val="3689368733"/>
       </p:ext>
     </p:extLst>
   </p:cSld>
@@ -52379,35 +51915,6 @@
           </a:p>
         </p:txBody>
       </p:sp>
-      <p:pic>
-        <p:nvPicPr>
-          <p:cNvPr id="5" name="Content Placeholder 4"/>
-          <p:cNvPicPr>
-            <a:picLocks noGrp="1" noChangeAspect="1"/>
-          </p:cNvPicPr>
-          <p:nvPr>
-            <p:ph idx="1"/>
-          </p:nvPr>
-        </p:nvPicPr>
-        <p:blipFill>
-          <a:blip r:embed="rId2">
-            <a:extLst>
-              <a:ext uri="{28A0092B-C50C-407E-A947-70E740481C1C}">
-                <a14:useLocalDpi xmlns:a14="http://schemas.microsoft.com/office/drawing/2010/main" val="0"/>
-              </a:ext>
-            </a:extLst>
-          </a:blip>
-          <a:stretch>
-            <a:fillRect/>
-          </a:stretch>
-        </p:blipFill>
-        <p:spPr>
-          <a:xfrm>
-            <a:off x="457200" y="1914586"/>
-            <a:ext cx="8229600" cy="3897190"/>
-          </a:xfrm>
-        </p:spPr>
-      </p:pic>
       <p:sp>
         <p:nvSpPr>
           <p:cNvPr id="4" name="Slide Number Placeholder 3"/>
@@ -52426,89 +51933,6 @@
             <a:fld id="{D3111AAA-2ECE-4969-9195-D9C506454076}" type="slidenum">
               <a:rPr lang="en-US" smtClean="0"/>
               <a:t>62</a:t>
-            </a:fld>
-            <a:endParaRPr lang="en-US"/>
-          </a:p>
-        </p:txBody>
-      </p:sp>
-    </p:spTree>
-    <p:extLst>
-      <p:ext uri="{BB962C8B-B14F-4D97-AF65-F5344CB8AC3E}">
-        <p14:creationId xmlns:p14="http://schemas.microsoft.com/office/powerpoint/2010/main" val="3689368733"/>
-      </p:ext>
-    </p:extLst>
-  </p:cSld>
-  <p:clrMapOvr>
-    <a:masterClrMapping/>
-  </p:clrMapOvr>
-  <p:timing>
-    <p:tnLst>
-      <p:par>
-        <p:cTn id="1" dur="indefinite" restart="never" nodeType="tmRoot"/>
-      </p:par>
-    </p:tnLst>
-  </p:timing>
-</p:sld>
-</file>
-
-<file path=ppt/slides/slide63.xml><?xml version="1.0" encoding="utf-8"?>
-<p:sld xmlns:a="http://schemas.openxmlformats.org/drawingml/2006/main" xmlns:r="http://schemas.openxmlformats.org/officeDocument/2006/relationships" xmlns:p="http://schemas.openxmlformats.org/presentationml/2006/main">
-  <p:cSld>
-    <p:spTree>
-      <p:nvGrpSpPr>
-        <p:cNvPr id="1" name=""/>
-        <p:cNvGrpSpPr/>
-        <p:nvPr/>
-      </p:nvGrpSpPr>
-      <p:grpSpPr>
-        <a:xfrm>
-          <a:off x="0" y="0"/>
-          <a:ext cx="0" cy="0"/>
-          <a:chOff x="0" y="0"/>
-          <a:chExt cx="0" cy="0"/>
-        </a:xfrm>
-      </p:grpSpPr>
-      <p:sp>
-        <p:nvSpPr>
-          <p:cNvPr id="2" name="Title 1"/>
-          <p:cNvSpPr>
-            <a:spLocks noGrp="1"/>
-          </p:cNvSpPr>
-          <p:nvPr>
-            <p:ph type="title"/>
-          </p:nvPr>
-        </p:nvSpPr>
-        <p:spPr/>
-        <p:txBody>
-          <a:bodyPr/>
-          <a:lstStyle/>
-          <a:p>
-            <a:r>
-              <a:rPr lang="en-US" sz="5400" dirty="0" smtClean="0"/>
-              <a:t>Limit Outstanding Requests</a:t>
-            </a:r>
-            <a:endParaRPr lang="en-US" sz="5400" dirty="0"/>
-          </a:p>
-        </p:txBody>
-      </p:sp>
-      <p:sp>
-        <p:nvSpPr>
-          <p:cNvPr id="4" name="Slide Number Placeholder 3"/>
-          <p:cNvSpPr>
-            <a:spLocks noGrp="1"/>
-          </p:cNvSpPr>
-          <p:nvPr>
-            <p:ph type="sldNum" sz="quarter" idx="12"/>
-          </p:nvPr>
-        </p:nvSpPr>
-        <p:spPr/>
-        <p:txBody>
-          <a:bodyPr/>
-          <a:lstStyle/>
-          <a:p>
-            <a:fld id="{D3111AAA-2ECE-4969-9195-D9C506454076}" type="slidenum">
-              <a:rPr lang="en-US" smtClean="0"/>
-              <a:t>63</a:t>
             </a:fld>
             <a:endParaRPr lang="en-US"/>
           </a:p>
@@ -52557,2077 +51981,6 @@
     <p:tnLst>
       <p:par>
         <p:cTn id="1" dur="indefinite" restart="never" nodeType="tmRoot"/>
-      </p:par>
-    </p:tnLst>
-  </p:timing>
-</p:sld>
-</file>
-
-<file path=ppt/slides/slide64.xml><?xml version="1.0" encoding="utf-8"?>
-<p:sld xmlns:a="http://schemas.openxmlformats.org/drawingml/2006/main" xmlns:r="http://schemas.openxmlformats.org/officeDocument/2006/relationships" xmlns:p="http://schemas.openxmlformats.org/presentationml/2006/main">
-  <p:cSld>
-    <p:spTree>
-      <p:nvGrpSpPr>
-        <p:cNvPr id="1" name=""/>
-        <p:cNvGrpSpPr/>
-        <p:nvPr/>
-      </p:nvGrpSpPr>
-      <p:grpSpPr>
-        <a:xfrm>
-          <a:off x="0" y="0"/>
-          <a:ext cx="0" cy="0"/>
-          <a:chOff x="0" y="0"/>
-          <a:chExt cx="0" cy="0"/>
-        </a:xfrm>
-      </p:grpSpPr>
-      <p:pic>
-        <p:nvPicPr>
-          <p:cNvPr id="2" name="Picture 1"/>
-          <p:cNvPicPr>
-            <a:picLocks noChangeAspect="1"/>
-          </p:cNvPicPr>
-          <p:nvPr/>
-        </p:nvPicPr>
-        <p:blipFill rotWithShape="1">
-          <a:blip r:embed="rId2" cstate="print">
-            <a:extLst>
-              <a:ext uri="{28A0092B-C50C-407E-A947-70E740481C1C}">
-                <a14:useLocalDpi xmlns:a14="http://schemas.microsoft.com/office/drawing/2010/main" val="0"/>
-              </a:ext>
-            </a:extLst>
-          </a:blip>
-          <a:srcRect t="25794" b="31041"/>
-          <a:stretch/>
-        </p:blipFill>
-        <p:spPr>
-          <a:xfrm>
-            <a:off x="3827865" y="914400"/>
-            <a:ext cx="1435603" cy="619676"/>
-          </a:xfrm>
-          <a:prstGeom prst="rect">
-            <a:avLst/>
-          </a:prstGeom>
-        </p:spPr>
-      </p:pic>
-      <p:pic>
-        <p:nvPicPr>
-          <p:cNvPr id="3" name="Picture 2"/>
-          <p:cNvPicPr>
-            <a:picLocks noChangeAspect="1"/>
-          </p:cNvPicPr>
-          <p:nvPr/>
-        </p:nvPicPr>
-        <p:blipFill rotWithShape="1">
-          <a:blip r:embed="rId3" cstate="print">
-            <a:extLst>
-              <a:ext uri="{28A0092B-C50C-407E-A947-70E740481C1C}">
-                <a14:useLocalDpi xmlns:a14="http://schemas.microsoft.com/office/drawing/2010/main" val="0"/>
-              </a:ext>
-            </a:extLst>
-          </a:blip>
-          <a:srcRect l="12576" r="12576" b="35411"/>
-          <a:stretch/>
-        </p:blipFill>
-        <p:spPr>
-          <a:xfrm>
-            <a:off x="3810000" y="3524938"/>
-            <a:ext cx="1453468" cy="742262"/>
-          </a:xfrm>
-          <a:prstGeom prst="rect">
-            <a:avLst/>
-          </a:prstGeom>
-        </p:spPr>
-      </p:pic>
-      <p:pic>
-        <p:nvPicPr>
-          <p:cNvPr id="4" name="Picture 3"/>
-          <p:cNvPicPr>
-            <a:picLocks noChangeAspect="1"/>
-          </p:cNvPicPr>
-          <p:nvPr/>
-        </p:nvPicPr>
-        <p:blipFill>
-          <a:blip r:embed="rId4" cstate="print">
-            <a:extLst>
-              <a:ext uri="{28A0092B-C50C-407E-A947-70E740481C1C}">
-                <a14:useLocalDpi xmlns:a14="http://schemas.microsoft.com/office/drawing/2010/main" val="0"/>
-              </a:ext>
-            </a:extLst>
-          </a:blip>
-          <a:stretch>
-            <a:fillRect/>
-          </a:stretch>
-        </p:blipFill>
-        <p:spPr>
-          <a:xfrm>
-            <a:off x="3815668" y="1905000"/>
-            <a:ext cx="1453468" cy="1235448"/>
-          </a:xfrm>
-          <a:prstGeom prst="rect">
-            <a:avLst/>
-          </a:prstGeom>
-        </p:spPr>
-      </p:pic>
-      <p:pic>
-        <p:nvPicPr>
-          <p:cNvPr id="5" name="Picture 4"/>
-          <p:cNvPicPr>
-            <a:picLocks noChangeAspect="1"/>
-          </p:cNvPicPr>
-          <p:nvPr/>
-        </p:nvPicPr>
-        <p:blipFill rotWithShape="1">
-          <a:blip r:embed="rId5">
-            <a:extLst>
-              <a:ext uri="{28A0092B-C50C-407E-A947-70E740481C1C}">
-                <a14:useLocalDpi xmlns:a14="http://schemas.microsoft.com/office/drawing/2010/main" val="0"/>
-              </a:ext>
-            </a:extLst>
-          </a:blip>
-          <a:srcRect l="5397" t="23808" r="12677" b="22623"/>
-          <a:stretch/>
-        </p:blipFill>
-        <p:spPr>
-          <a:xfrm>
-            <a:off x="6096000" y="1981200"/>
-            <a:ext cx="2522157" cy="1236877"/>
-          </a:xfrm>
-          <a:prstGeom prst="rect">
-            <a:avLst/>
-          </a:prstGeom>
-        </p:spPr>
-      </p:pic>
-      <p:pic>
-        <p:nvPicPr>
-          <p:cNvPr id="6" name="Picture 5"/>
-          <p:cNvPicPr>
-            <a:picLocks noChangeAspect="1"/>
-          </p:cNvPicPr>
-          <p:nvPr/>
-        </p:nvPicPr>
-        <p:blipFill>
-          <a:blip r:embed="rId6" cstate="print">
-            <a:extLst>
-              <a:ext uri="{28A0092B-C50C-407E-A947-70E740481C1C}">
-                <a14:useLocalDpi xmlns:a14="http://schemas.microsoft.com/office/drawing/2010/main" val="0"/>
-              </a:ext>
-            </a:extLst>
-          </a:blip>
-          <a:stretch>
-            <a:fillRect/>
-          </a:stretch>
-        </p:blipFill>
-        <p:spPr>
-          <a:xfrm>
-            <a:off x="685800" y="2471293"/>
-            <a:ext cx="1933623" cy="662916"/>
-          </a:xfrm>
-          <a:prstGeom prst="rect">
-            <a:avLst/>
-          </a:prstGeom>
-        </p:spPr>
-      </p:pic>
-      <p:sp>
-        <p:nvSpPr>
-          <p:cNvPr id="7" name="TextBox 6"/>
-          <p:cNvSpPr txBox="1"/>
-          <p:nvPr/>
-        </p:nvSpPr>
-        <p:spPr>
-          <a:xfrm>
-            <a:off x="0" y="5225705"/>
-            <a:ext cx="3044952" cy="707886"/>
-          </a:xfrm>
-          <a:prstGeom prst="rect">
-            <a:avLst/>
-          </a:prstGeom>
-          <a:noFill/>
-        </p:spPr>
-        <p:txBody>
-          <a:bodyPr wrap="square" rtlCol="0">
-            <a:spAutoFit/>
-          </a:bodyPr>
-          <a:lstStyle/>
-          <a:p>
-            <a:pPr algn="ctr"/>
-            <a:r>
-              <a:rPr lang="en-US" sz="4000" dirty="0" smtClean="0">
-                <a:latin typeface="Gill Sans MT" pitchFamily="34" charset="0"/>
-              </a:rPr>
-              <a:t>Search</a:t>
-            </a:r>
-            <a:endParaRPr lang="en-US" sz="4000" dirty="0">
-              <a:latin typeface="Gill Sans MT" pitchFamily="34" charset="0"/>
-            </a:endParaRPr>
-          </a:p>
-        </p:txBody>
-      </p:sp>
-      <p:sp>
-        <p:nvSpPr>
-          <p:cNvPr id="8" name="TextBox 7"/>
-          <p:cNvSpPr txBox="1"/>
-          <p:nvPr/>
-        </p:nvSpPr>
-        <p:spPr>
-          <a:xfrm>
-            <a:off x="3048000" y="5225705"/>
-            <a:ext cx="3044952" cy="707886"/>
-          </a:xfrm>
-          <a:prstGeom prst="rect">
-            <a:avLst/>
-          </a:prstGeom>
-          <a:noFill/>
-        </p:spPr>
-        <p:txBody>
-          <a:bodyPr wrap="square" rtlCol="0">
-            <a:spAutoFit/>
-          </a:bodyPr>
-          <a:lstStyle/>
-          <a:p>
-            <a:pPr algn="ctr"/>
-            <a:r>
-              <a:rPr lang="en-US" sz="4000" dirty="0" smtClean="0">
-                <a:latin typeface="Gill Sans MT" pitchFamily="34" charset="0"/>
-              </a:rPr>
-              <a:t>Browse</a:t>
-            </a:r>
-            <a:endParaRPr lang="en-US" sz="4000" dirty="0">
-              <a:latin typeface="Gill Sans MT" pitchFamily="34" charset="0"/>
-            </a:endParaRPr>
-          </a:p>
-        </p:txBody>
-      </p:sp>
-      <p:sp>
-        <p:nvSpPr>
-          <p:cNvPr id="9" name="TextBox 8"/>
-          <p:cNvSpPr txBox="1"/>
-          <p:nvPr/>
-        </p:nvSpPr>
-        <p:spPr>
-          <a:xfrm>
-            <a:off x="6099048" y="5225705"/>
-            <a:ext cx="3044952" cy="707886"/>
-          </a:xfrm>
-          <a:prstGeom prst="rect">
-            <a:avLst/>
-          </a:prstGeom>
-          <a:noFill/>
-        </p:spPr>
-        <p:txBody>
-          <a:bodyPr wrap="square" rtlCol="0">
-            <a:spAutoFit/>
-          </a:bodyPr>
-          <a:lstStyle/>
-          <a:p>
-            <a:pPr algn="ctr"/>
-            <a:r>
-              <a:rPr lang="en-US" sz="4000" dirty="0" smtClean="0">
-                <a:latin typeface="Gill Sans MT" pitchFamily="34" charset="0"/>
-              </a:rPr>
-              <a:t>Decide</a:t>
-            </a:r>
-            <a:endParaRPr lang="en-US" sz="4000" dirty="0">
-              <a:latin typeface="Gill Sans MT" pitchFamily="34" charset="0"/>
-            </a:endParaRPr>
-          </a:p>
-        </p:txBody>
-      </p:sp>
-      <p:sp>
-        <p:nvSpPr>
-          <p:cNvPr id="10" name="Right Arrow 9"/>
-          <p:cNvSpPr/>
-          <p:nvPr/>
-        </p:nvSpPr>
-        <p:spPr>
-          <a:xfrm>
-            <a:off x="2667000" y="5410200"/>
-            <a:ext cx="609600" cy="381000"/>
-          </a:xfrm>
-          <a:prstGeom prst="rightArrow">
-            <a:avLst/>
-          </a:prstGeom>
-          <a:ln>
-            <a:noFill/>
-          </a:ln>
-        </p:spPr>
-        <p:style>
-          <a:lnRef idx="2">
-            <a:schemeClr val="dk1"/>
-          </a:lnRef>
-          <a:fillRef idx="1">
-            <a:schemeClr val="lt1"/>
-          </a:fillRef>
-          <a:effectRef idx="0">
-            <a:schemeClr val="dk1"/>
-          </a:effectRef>
-          <a:fontRef idx="minor">
-            <a:schemeClr val="dk1"/>
-          </a:fontRef>
-        </p:style>
-        <p:txBody>
-          <a:bodyPr rtlCol="0" anchor="ctr"/>
-          <a:lstStyle/>
-          <a:p>
-            <a:pPr algn="ctr"/>
-            <a:endParaRPr lang="en-US"/>
-          </a:p>
-        </p:txBody>
-      </p:sp>
-      <p:sp>
-        <p:nvSpPr>
-          <p:cNvPr id="11" name="Right Arrow 10"/>
-          <p:cNvSpPr/>
-          <p:nvPr/>
-        </p:nvSpPr>
-        <p:spPr>
-          <a:xfrm>
-            <a:off x="5867400" y="5410200"/>
-            <a:ext cx="609600" cy="381000"/>
-          </a:xfrm>
-          <a:prstGeom prst="rightArrow">
-            <a:avLst/>
-          </a:prstGeom>
-          <a:ln>
-            <a:noFill/>
-          </a:ln>
-        </p:spPr>
-        <p:style>
-          <a:lnRef idx="2">
-            <a:schemeClr val="dk1"/>
-          </a:lnRef>
-          <a:fillRef idx="1">
-            <a:schemeClr val="lt1"/>
-          </a:fillRef>
-          <a:effectRef idx="0">
-            <a:schemeClr val="dk1"/>
-          </a:effectRef>
-          <a:fontRef idx="minor">
-            <a:schemeClr val="dk1"/>
-          </a:fontRef>
-        </p:style>
-        <p:txBody>
-          <a:bodyPr rtlCol="0" anchor="ctr"/>
-          <a:lstStyle/>
-          <a:p>
-            <a:pPr algn="ctr"/>
-            <a:endParaRPr lang="en-US"/>
-          </a:p>
-        </p:txBody>
-      </p:sp>
-      <p:sp>
-        <p:nvSpPr>
-          <p:cNvPr id="12" name="Slide Number Placeholder 11"/>
-          <p:cNvSpPr>
-            <a:spLocks noGrp="1"/>
-          </p:cNvSpPr>
-          <p:nvPr>
-            <p:ph type="sldNum" sz="quarter" idx="12"/>
-          </p:nvPr>
-        </p:nvSpPr>
-        <p:spPr/>
-        <p:txBody>
-          <a:bodyPr/>
-          <a:lstStyle/>
-          <a:p>
-            <a:fld id="{318BA781-E589-4C61-8C8B-F5ECA1300D5B}" type="slidenum">
-              <a:rPr lang="en-US" smtClean="0"/>
-              <a:t>64</a:t>
-            </a:fld>
-            <a:endParaRPr lang="en-US"/>
-          </a:p>
-        </p:txBody>
-      </p:sp>
-    </p:spTree>
-    <p:extLst>
-      <p:ext uri="{BB962C8B-B14F-4D97-AF65-F5344CB8AC3E}">
-        <p14:creationId xmlns:p14="http://schemas.microsoft.com/office/powerpoint/2010/main" val="4158060722"/>
-      </p:ext>
-    </p:extLst>
-  </p:cSld>
-  <p:clrMapOvr>
-    <a:masterClrMapping/>
-  </p:clrMapOvr>
-  <p:timing>
-    <p:tnLst>
-      <p:par>
-        <p:cTn id="1" dur="indefinite" restart="never" nodeType="tmRoot">
-          <p:childTnLst>
-            <p:seq concurrent="1" nextAc="seek">
-              <p:cTn id="2" dur="indefinite" nodeType="mainSeq">
-                <p:childTnLst>
-                  <p:par>
-                    <p:cTn id="3" fill="hold">
-                      <p:stCondLst>
-                        <p:cond delay="indefinite"/>
-                      </p:stCondLst>
-                      <p:childTnLst>
-                        <p:par>
-                          <p:cTn id="4" fill="hold">
-                            <p:stCondLst>
-                              <p:cond delay="0"/>
-                            </p:stCondLst>
-                            <p:childTnLst>
-                              <p:par>
-                                <p:cTn id="5" presetID="1" presetClass="entr" presetSubtype="0" fill="hold" nodeType="clickEffect">
-                                  <p:stCondLst>
-                                    <p:cond delay="0"/>
-                                  </p:stCondLst>
-                                  <p:childTnLst>
-                                    <p:set>
-                                      <p:cBhvr>
-                                        <p:cTn id="6" dur="1" fill="hold">
-                                          <p:stCondLst>
-                                            <p:cond delay="0"/>
-                                          </p:stCondLst>
-                                        </p:cTn>
-                                        <p:tgtEl>
-                                          <p:spTgt spid="6"/>
-                                        </p:tgtEl>
-                                        <p:attrNameLst>
-                                          <p:attrName>style.visibility</p:attrName>
-                                        </p:attrNameLst>
-                                      </p:cBhvr>
-                                      <p:to>
-                                        <p:strVal val="visible"/>
-                                      </p:to>
-                                    </p:set>
-                                  </p:childTnLst>
-                                </p:cTn>
-                              </p:par>
-                              <p:par>
-                                <p:cTn id="7" presetID="1" presetClass="entr" presetSubtype="0" fill="hold" grpId="0" nodeType="withEffect">
-                                  <p:stCondLst>
-                                    <p:cond delay="0"/>
-                                  </p:stCondLst>
-                                  <p:childTnLst>
-                                    <p:set>
-                                      <p:cBhvr>
-                                        <p:cTn id="8" dur="1" fill="hold">
-                                          <p:stCondLst>
-                                            <p:cond delay="0"/>
-                                          </p:stCondLst>
-                                        </p:cTn>
-                                        <p:tgtEl>
-                                          <p:spTgt spid="7"/>
-                                        </p:tgtEl>
-                                        <p:attrNameLst>
-                                          <p:attrName>style.visibility</p:attrName>
-                                        </p:attrNameLst>
-                                      </p:cBhvr>
-                                      <p:to>
-                                        <p:strVal val="visible"/>
-                                      </p:to>
-                                    </p:set>
-                                  </p:childTnLst>
-                                </p:cTn>
-                              </p:par>
-                            </p:childTnLst>
-                          </p:cTn>
-                        </p:par>
-                      </p:childTnLst>
-                    </p:cTn>
-                  </p:par>
-                  <p:par>
-                    <p:cTn id="9" fill="hold">
-                      <p:stCondLst>
-                        <p:cond delay="indefinite"/>
-                      </p:stCondLst>
-                      <p:childTnLst>
-                        <p:par>
-                          <p:cTn id="10" fill="hold">
-                            <p:stCondLst>
-                              <p:cond delay="0"/>
-                            </p:stCondLst>
-                            <p:childTnLst>
-                              <p:par>
-                                <p:cTn id="11" presetID="1" presetClass="entr" presetSubtype="0" fill="hold" grpId="0" nodeType="clickEffect">
-                                  <p:stCondLst>
-                                    <p:cond delay="0"/>
-                                  </p:stCondLst>
-                                  <p:childTnLst>
-                                    <p:set>
-                                      <p:cBhvr>
-                                        <p:cTn id="12" dur="1" fill="hold">
-                                          <p:stCondLst>
-                                            <p:cond delay="0"/>
-                                          </p:stCondLst>
-                                        </p:cTn>
-                                        <p:tgtEl>
-                                          <p:spTgt spid="10"/>
-                                        </p:tgtEl>
-                                        <p:attrNameLst>
-                                          <p:attrName>style.visibility</p:attrName>
-                                        </p:attrNameLst>
-                                      </p:cBhvr>
-                                      <p:to>
-                                        <p:strVal val="visible"/>
-                                      </p:to>
-                                    </p:set>
-                                  </p:childTnLst>
-                                </p:cTn>
-                              </p:par>
-                              <p:par>
-                                <p:cTn id="13" presetID="1" presetClass="entr" presetSubtype="0" fill="hold" grpId="0" nodeType="withEffect">
-                                  <p:stCondLst>
-                                    <p:cond delay="0"/>
-                                  </p:stCondLst>
-                                  <p:childTnLst>
-                                    <p:set>
-                                      <p:cBhvr>
-                                        <p:cTn id="14" dur="1" fill="hold">
-                                          <p:stCondLst>
-                                            <p:cond delay="0"/>
-                                          </p:stCondLst>
-                                        </p:cTn>
-                                        <p:tgtEl>
-                                          <p:spTgt spid="8"/>
-                                        </p:tgtEl>
-                                        <p:attrNameLst>
-                                          <p:attrName>style.visibility</p:attrName>
-                                        </p:attrNameLst>
-                                      </p:cBhvr>
-                                      <p:to>
-                                        <p:strVal val="visible"/>
-                                      </p:to>
-                                    </p:set>
-                                  </p:childTnLst>
-                                </p:cTn>
-                              </p:par>
-                              <p:par>
-                                <p:cTn id="15" presetID="1" presetClass="entr" presetSubtype="0" fill="hold" nodeType="withEffect">
-                                  <p:stCondLst>
-                                    <p:cond delay="0"/>
-                                  </p:stCondLst>
-                                  <p:childTnLst>
-                                    <p:set>
-                                      <p:cBhvr>
-                                        <p:cTn id="16" dur="1" fill="hold">
-                                          <p:stCondLst>
-                                            <p:cond delay="0"/>
-                                          </p:stCondLst>
-                                        </p:cTn>
-                                        <p:tgtEl>
-                                          <p:spTgt spid="3"/>
-                                        </p:tgtEl>
-                                        <p:attrNameLst>
-                                          <p:attrName>style.visibility</p:attrName>
-                                        </p:attrNameLst>
-                                      </p:cBhvr>
-                                      <p:to>
-                                        <p:strVal val="visible"/>
-                                      </p:to>
-                                    </p:set>
-                                  </p:childTnLst>
-                                </p:cTn>
-                              </p:par>
-                              <p:par>
-                                <p:cTn id="17" presetID="1" presetClass="entr" presetSubtype="0" fill="hold" nodeType="withEffect">
-                                  <p:stCondLst>
-                                    <p:cond delay="0"/>
-                                  </p:stCondLst>
-                                  <p:childTnLst>
-                                    <p:set>
-                                      <p:cBhvr>
-                                        <p:cTn id="18" dur="1" fill="hold">
-                                          <p:stCondLst>
-                                            <p:cond delay="0"/>
-                                          </p:stCondLst>
-                                        </p:cTn>
-                                        <p:tgtEl>
-                                          <p:spTgt spid="4"/>
-                                        </p:tgtEl>
-                                        <p:attrNameLst>
-                                          <p:attrName>style.visibility</p:attrName>
-                                        </p:attrNameLst>
-                                      </p:cBhvr>
-                                      <p:to>
-                                        <p:strVal val="visible"/>
-                                      </p:to>
-                                    </p:set>
-                                  </p:childTnLst>
-                                </p:cTn>
-                              </p:par>
-                              <p:par>
-                                <p:cTn id="19" presetID="1" presetClass="entr" presetSubtype="0" fill="hold" nodeType="withEffect">
-                                  <p:stCondLst>
-                                    <p:cond delay="0"/>
-                                  </p:stCondLst>
-                                  <p:childTnLst>
-                                    <p:set>
-                                      <p:cBhvr>
-                                        <p:cTn id="20" dur="1" fill="hold">
-                                          <p:stCondLst>
-                                            <p:cond delay="0"/>
-                                          </p:stCondLst>
-                                        </p:cTn>
-                                        <p:tgtEl>
-                                          <p:spTgt spid="2"/>
-                                        </p:tgtEl>
-                                        <p:attrNameLst>
-                                          <p:attrName>style.visibility</p:attrName>
-                                        </p:attrNameLst>
-                                      </p:cBhvr>
-                                      <p:to>
-                                        <p:strVal val="visible"/>
-                                      </p:to>
-                                    </p:set>
-                                  </p:childTnLst>
-                                </p:cTn>
-                              </p:par>
-                            </p:childTnLst>
-                          </p:cTn>
-                        </p:par>
-                      </p:childTnLst>
-                    </p:cTn>
-                  </p:par>
-                  <p:par>
-                    <p:cTn id="21" fill="hold">
-                      <p:stCondLst>
-                        <p:cond delay="indefinite"/>
-                      </p:stCondLst>
-                      <p:childTnLst>
-                        <p:par>
-                          <p:cTn id="22" fill="hold">
-                            <p:stCondLst>
-                              <p:cond delay="0"/>
-                            </p:stCondLst>
-                            <p:childTnLst>
-                              <p:par>
-                                <p:cTn id="23" presetID="1" presetClass="entr" presetSubtype="0" fill="hold" grpId="0" nodeType="clickEffect">
-                                  <p:stCondLst>
-                                    <p:cond delay="0"/>
-                                  </p:stCondLst>
-                                  <p:childTnLst>
-                                    <p:set>
-                                      <p:cBhvr>
-                                        <p:cTn id="24" dur="1" fill="hold">
-                                          <p:stCondLst>
-                                            <p:cond delay="0"/>
-                                          </p:stCondLst>
-                                        </p:cTn>
-                                        <p:tgtEl>
-                                          <p:spTgt spid="11"/>
-                                        </p:tgtEl>
-                                        <p:attrNameLst>
-                                          <p:attrName>style.visibility</p:attrName>
-                                        </p:attrNameLst>
-                                      </p:cBhvr>
-                                      <p:to>
-                                        <p:strVal val="visible"/>
-                                      </p:to>
-                                    </p:set>
-                                  </p:childTnLst>
-                                </p:cTn>
-                              </p:par>
-                              <p:par>
-                                <p:cTn id="25" presetID="1" presetClass="entr" presetSubtype="0" fill="hold" grpId="0" nodeType="withEffect">
-                                  <p:stCondLst>
-                                    <p:cond delay="0"/>
-                                  </p:stCondLst>
-                                  <p:childTnLst>
-                                    <p:set>
-                                      <p:cBhvr>
-                                        <p:cTn id="26" dur="1" fill="hold">
-                                          <p:stCondLst>
-                                            <p:cond delay="0"/>
-                                          </p:stCondLst>
-                                        </p:cTn>
-                                        <p:tgtEl>
-                                          <p:spTgt spid="9"/>
-                                        </p:tgtEl>
-                                        <p:attrNameLst>
-                                          <p:attrName>style.visibility</p:attrName>
-                                        </p:attrNameLst>
-                                      </p:cBhvr>
-                                      <p:to>
-                                        <p:strVal val="visible"/>
-                                      </p:to>
-                                    </p:set>
-                                  </p:childTnLst>
-                                </p:cTn>
-                              </p:par>
-                              <p:par>
-                                <p:cTn id="27" presetID="1" presetClass="entr" presetSubtype="0" fill="hold" nodeType="withEffect">
-                                  <p:stCondLst>
-                                    <p:cond delay="0"/>
-                                  </p:stCondLst>
-                                  <p:childTnLst>
-                                    <p:set>
-                                      <p:cBhvr>
-                                        <p:cTn id="28" dur="1" fill="hold">
-                                          <p:stCondLst>
-                                            <p:cond delay="0"/>
-                                          </p:stCondLst>
-                                        </p:cTn>
-                                        <p:tgtEl>
-                                          <p:spTgt spid="5"/>
-                                        </p:tgtEl>
-                                        <p:attrNameLst>
-                                          <p:attrName>style.visibility</p:attrName>
-                                        </p:attrNameLst>
-                                      </p:cBhvr>
-                                      <p:to>
-                                        <p:strVal val="visible"/>
-                                      </p:to>
-                                    </p:set>
-                                  </p:childTnLst>
-                                </p:cTn>
-                              </p:par>
-                            </p:childTnLst>
-                          </p:cTn>
-                        </p:par>
-                      </p:childTnLst>
-                    </p:cTn>
-                  </p:par>
-                </p:childTnLst>
-              </p:cTn>
-              <p:prevCondLst>
-                <p:cond evt="onPrev" delay="0">
-                  <p:tgtEl>
-                    <p:sldTgt/>
-                  </p:tgtEl>
-                </p:cond>
-              </p:prevCondLst>
-              <p:nextCondLst>
-                <p:cond evt="onNext" delay="0">
-                  <p:tgtEl>
-                    <p:sldTgt/>
-                  </p:tgtEl>
-                </p:cond>
-              </p:nextCondLst>
-            </p:seq>
-          </p:childTnLst>
-        </p:cTn>
-      </p:par>
-    </p:tnLst>
-    <p:bldLst>
-      <p:bldP spid="7" grpId="0"/>
-      <p:bldP spid="8" grpId="0"/>
-      <p:bldP spid="9" grpId="0"/>
-      <p:bldP spid="10" grpId="0" animBg="1"/>
-      <p:bldP spid="11" grpId="0" animBg="1"/>
-    </p:bldLst>
-  </p:timing>
-</p:sld>
-</file>
-
-<file path=ppt/slides/slide65.xml><?xml version="1.0" encoding="utf-8"?>
-<p:sld xmlns:a="http://schemas.openxmlformats.org/drawingml/2006/main" xmlns:r="http://schemas.openxmlformats.org/officeDocument/2006/relationships" xmlns:p="http://schemas.openxmlformats.org/presentationml/2006/main">
-  <p:cSld>
-    <p:spTree>
-      <p:nvGrpSpPr>
-        <p:cNvPr id="1" name=""/>
-        <p:cNvGrpSpPr/>
-        <p:nvPr/>
-      </p:nvGrpSpPr>
-      <p:grpSpPr>
-        <a:xfrm>
-          <a:off x="0" y="0"/>
-          <a:ext cx="0" cy="0"/>
-          <a:chOff x="0" y="0"/>
-          <a:chExt cx="0" cy="0"/>
-        </a:xfrm>
-      </p:grpSpPr>
-      <p:pic>
-        <p:nvPicPr>
-          <p:cNvPr id="8" name="Picture 7"/>
-          <p:cNvPicPr>
-            <a:picLocks noChangeAspect="1"/>
-          </p:cNvPicPr>
-          <p:nvPr/>
-        </p:nvPicPr>
-        <p:blipFill>
-          <a:blip r:embed="rId2">
-            <a:extLst>
-              <a:ext uri="{28A0092B-C50C-407E-A947-70E740481C1C}">
-                <a14:useLocalDpi xmlns:a14="http://schemas.microsoft.com/office/drawing/2010/main" val="0"/>
-              </a:ext>
-            </a:extLst>
-          </a:blip>
-          <a:stretch>
-            <a:fillRect/>
-          </a:stretch>
-        </p:blipFill>
-        <p:spPr>
-          <a:xfrm>
-            <a:off x="1641050" y="0"/>
-            <a:ext cx="5861900" cy="6858000"/>
-          </a:xfrm>
-          <a:prstGeom prst="rect">
-            <a:avLst/>
-          </a:prstGeom>
-        </p:spPr>
-      </p:pic>
-      <p:sp>
-        <p:nvSpPr>
-          <p:cNvPr id="2" name="Slide Number Placeholder 1"/>
-          <p:cNvSpPr>
-            <a:spLocks noGrp="1"/>
-          </p:cNvSpPr>
-          <p:nvPr>
-            <p:ph type="sldNum" sz="quarter" idx="12"/>
-          </p:nvPr>
-        </p:nvSpPr>
-        <p:spPr/>
-        <p:txBody>
-          <a:bodyPr/>
-          <a:lstStyle/>
-          <a:p>
-            <a:fld id="{318BA781-E589-4C61-8C8B-F5ECA1300D5B}" type="slidenum">
-              <a:rPr lang="en-US" smtClean="0"/>
-              <a:t>65</a:t>
-            </a:fld>
-            <a:endParaRPr lang="en-US"/>
-          </a:p>
-        </p:txBody>
-      </p:sp>
-    </p:spTree>
-    <p:extLst>
-      <p:ext uri="{BB962C8B-B14F-4D97-AF65-F5344CB8AC3E}">
-        <p14:creationId xmlns:p14="http://schemas.microsoft.com/office/powerpoint/2010/main" val="9184332"/>
-      </p:ext>
-    </p:extLst>
-  </p:cSld>
-  <p:clrMapOvr>
-    <a:masterClrMapping/>
-  </p:clrMapOvr>
-  <p:timing>
-    <p:tnLst>
-      <p:par>
-        <p:cTn id="1" dur="indefinite" restart="never" nodeType="tmRoot"/>
-      </p:par>
-    </p:tnLst>
-  </p:timing>
-</p:sld>
-</file>
-
-<file path=ppt/slides/slide66.xml><?xml version="1.0" encoding="utf-8"?>
-<p:sld xmlns:a="http://schemas.openxmlformats.org/drawingml/2006/main" xmlns:r="http://schemas.openxmlformats.org/officeDocument/2006/relationships" xmlns:p="http://schemas.openxmlformats.org/presentationml/2006/main">
-  <p:cSld>
-    <p:spTree>
-      <p:nvGrpSpPr>
-        <p:cNvPr id="1" name=""/>
-        <p:cNvGrpSpPr/>
-        <p:nvPr/>
-      </p:nvGrpSpPr>
-      <p:grpSpPr>
-        <a:xfrm>
-          <a:off x="0" y="0"/>
-          <a:ext cx="0" cy="0"/>
-          <a:chOff x="0" y="0"/>
-          <a:chExt cx="0" cy="0"/>
-        </a:xfrm>
-      </p:grpSpPr>
-      <p:pic>
-        <p:nvPicPr>
-          <p:cNvPr id="2" name="Picture 1"/>
-          <p:cNvPicPr>
-            <a:picLocks noChangeAspect="1"/>
-          </p:cNvPicPr>
-          <p:nvPr/>
-        </p:nvPicPr>
-        <p:blipFill>
-          <a:blip r:embed="rId2">
-            <a:extLst>
-              <a:ext uri="{28A0092B-C50C-407E-A947-70E740481C1C}">
-                <a14:useLocalDpi xmlns:a14="http://schemas.microsoft.com/office/drawing/2010/main" val="0"/>
-              </a:ext>
-            </a:extLst>
-          </a:blip>
-          <a:stretch>
-            <a:fillRect/>
-          </a:stretch>
-        </p:blipFill>
-        <p:spPr>
-          <a:xfrm>
-            <a:off x="1641050" y="0"/>
-            <a:ext cx="5861900" cy="6858000"/>
-          </a:xfrm>
-          <a:prstGeom prst="rect">
-            <a:avLst/>
-          </a:prstGeom>
-        </p:spPr>
-      </p:pic>
-      <p:sp>
-        <p:nvSpPr>
-          <p:cNvPr id="3" name="TextBox 2"/>
-          <p:cNvSpPr txBox="1"/>
-          <p:nvPr/>
-        </p:nvSpPr>
-        <p:spPr>
-          <a:xfrm>
-            <a:off x="1905000" y="1600200"/>
-            <a:ext cx="2895600" cy="646331"/>
-          </a:xfrm>
-          <a:prstGeom prst="rect">
-            <a:avLst/>
-          </a:prstGeom>
-          <a:ln>
-            <a:noFill/>
-          </a:ln>
-        </p:spPr>
-        <p:style>
-          <a:lnRef idx="2">
-            <a:schemeClr val="accent3">
-              <a:shade val="50000"/>
-            </a:schemeClr>
-          </a:lnRef>
-          <a:fillRef idx="1">
-            <a:schemeClr val="accent3"/>
-          </a:fillRef>
-          <a:effectRef idx="0">
-            <a:schemeClr val="accent3"/>
-          </a:effectRef>
-          <a:fontRef idx="minor">
-            <a:schemeClr val="lt1"/>
-          </a:fontRef>
-        </p:style>
-        <p:txBody>
-          <a:bodyPr wrap="square" rtlCol="0">
-            <a:spAutoFit/>
-          </a:bodyPr>
-          <a:lstStyle/>
-          <a:p>
-            <a:pPr algn="ctr"/>
-            <a:r>
-              <a:rPr lang="en-US" sz="3600" dirty="0" smtClean="0">
-                <a:latin typeface="Gill Sans MT" pitchFamily="34" charset="0"/>
-              </a:rPr>
-              <a:t>News For You</a:t>
-            </a:r>
-            <a:endParaRPr lang="en-US" sz="3600" dirty="0">
-              <a:latin typeface="Gill Sans MT" pitchFamily="34" charset="0"/>
-            </a:endParaRPr>
-          </a:p>
-        </p:txBody>
-      </p:sp>
-      <p:cxnSp>
-        <p:nvCxnSpPr>
-          <p:cNvPr id="5" name="Straight Arrow Connector 4"/>
-          <p:cNvCxnSpPr>
-            <a:stCxn id="3" idx="3"/>
-          </p:cNvCxnSpPr>
-          <p:nvPr/>
-        </p:nvCxnSpPr>
-        <p:spPr>
-          <a:xfrm flipV="1">
-            <a:off x="4800600" y="1923365"/>
-            <a:ext cx="762000" cy="1"/>
-          </a:xfrm>
-          <a:prstGeom prst="straightConnector1">
-            <a:avLst/>
-          </a:prstGeom>
-          <a:ln w="57150">
-            <a:headEnd type="none" w="med" len="med"/>
-            <a:tailEnd type="triangle" w="med" len="med"/>
-          </a:ln>
-        </p:spPr>
-        <p:style>
-          <a:lnRef idx="1">
-            <a:schemeClr val="accent3"/>
-          </a:lnRef>
-          <a:fillRef idx="0">
-            <a:schemeClr val="accent3"/>
-          </a:fillRef>
-          <a:effectRef idx="0">
-            <a:schemeClr val="accent3"/>
-          </a:effectRef>
-          <a:fontRef idx="minor">
-            <a:schemeClr val="tx1"/>
-          </a:fontRef>
-        </p:style>
-      </p:cxnSp>
-      <p:sp>
-        <p:nvSpPr>
-          <p:cNvPr id="4" name="Slide Number Placeholder 3"/>
-          <p:cNvSpPr>
-            <a:spLocks noGrp="1"/>
-          </p:cNvSpPr>
-          <p:nvPr>
-            <p:ph type="sldNum" sz="quarter" idx="12"/>
-          </p:nvPr>
-        </p:nvSpPr>
-        <p:spPr/>
-        <p:txBody>
-          <a:bodyPr/>
-          <a:lstStyle/>
-          <a:p>
-            <a:fld id="{318BA781-E589-4C61-8C8B-F5ECA1300D5B}" type="slidenum">
-              <a:rPr lang="en-US" smtClean="0"/>
-              <a:t>66</a:t>
-            </a:fld>
-            <a:endParaRPr lang="en-US"/>
-          </a:p>
-        </p:txBody>
-      </p:sp>
-    </p:spTree>
-    <p:extLst>
-      <p:ext uri="{BB962C8B-B14F-4D97-AF65-F5344CB8AC3E}">
-        <p14:creationId xmlns:p14="http://schemas.microsoft.com/office/powerpoint/2010/main" val="516859297"/>
-      </p:ext>
-    </p:extLst>
-  </p:cSld>
-  <p:clrMapOvr>
-    <a:masterClrMapping/>
-  </p:clrMapOvr>
-  <p:timing>
-    <p:tnLst>
-      <p:par>
-        <p:cTn id="1" dur="indefinite" restart="never" nodeType="tmRoot"/>
-      </p:par>
-    </p:tnLst>
-  </p:timing>
-</p:sld>
-</file>
-
-<file path=ppt/slides/slide67.xml><?xml version="1.0" encoding="utf-8"?>
-<p:sld xmlns:a="http://schemas.openxmlformats.org/drawingml/2006/main" xmlns:r="http://schemas.openxmlformats.org/officeDocument/2006/relationships" xmlns:p="http://schemas.openxmlformats.org/presentationml/2006/main">
-  <p:cSld>
-    <p:spTree>
-      <p:nvGrpSpPr>
-        <p:cNvPr id="1" name=""/>
-        <p:cNvGrpSpPr/>
-        <p:nvPr/>
-      </p:nvGrpSpPr>
-      <p:grpSpPr>
-        <a:xfrm>
-          <a:off x="0" y="0"/>
-          <a:ext cx="0" cy="0"/>
-          <a:chOff x="0" y="0"/>
-          <a:chExt cx="0" cy="0"/>
-        </a:xfrm>
-      </p:grpSpPr>
-      <p:sp>
-        <p:nvSpPr>
-          <p:cNvPr id="2" name="TextBox 1"/>
-          <p:cNvSpPr txBox="1"/>
-          <p:nvPr/>
-        </p:nvSpPr>
-        <p:spPr>
-          <a:xfrm>
-            <a:off x="0" y="921841"/>
-            <a:ext cx="3048000" cy="1015663"/>
-          </a:xfrm>
-          <a:prstGeom prst="rect">
-            <a:avLst/>
-          </a:prstGeom>
-          <a:noFill/>
-        </p:spPr>
-        <p:txBody>
-          <a:bodyPr wrap="square" rtlCol="0">
-            <a:spAutoFit/>
-          </a:bodyPr>
-          <a:lstStyle/>
-          <a:p>
-            <a:pPr algn="ctr"/>
-            <a:r>
-              <a:rPr lang="en-US" sz="6000" dirty="0" smtClean="0">
-                <a:latin typeface="Gill Sans MT" pitchFamily="34" charset="0"/>
-              </a:rPr>
-              <a:t>Good</a:t>
-            </a:r>
-            <a:endParaRPr lang="en-US" sz="6000" dirty="0">
-              <a:latin typeface="Gill Sans MT" pitchFamily="34" charset="0"/>
-            </a:endParaRPr>
-          </a:p>
-        </p:txBody>
-      </p:sp>
-      <p:sp>
-        <p:nvSpPr>
-          <p:cNvPr id="5" name="TextBox 4"/>
-          <p:cNvSpPr txBox="1"/>
-          <p:nvPr/>
-        </p:nvSpPr>
-        <p:spPr>
-          <a:xfrm>
-            <a:off x="3048000" y="921841"/>
-            <a:ext cx="3048000" cy="1015663"/>
-          </a:xfrm>
-          <a:prstGeom prst="rect">
-            <a:avLst/>
-          </a:prstGeom>
-          <a:noFill/>
-        </p:spPr>
-        <p:txBody>
-          <a:bodyPr wrap="square" rtlCol="0">
-            <a:spAutoFit/>
-          </a:bodyPr>
-          <a:lstStyle/>
-          <a:p>
-            <a:pPr algn="ctr"/>
-            <a:r>
-              <a:rPr lang="en-US" sz="6000" dirty="0" smtClean="0">
-                <a:latin typeface="Gill Sans MT" pitchFamily="34" charset="0"/>
-              </a:rPr>
-              <a:t>Better</a:t>
-            </a:r>
-            <a:endParaRPr lang="en-US" sz="6000" dirty="0">
-              <a:latin typeface="Gill Sans MT" pitchFamily="34" charset="0"/>
-            </a:endParaRPr>
-          </a:p>
-        </p:txBody>
-      </p:sp>
-      <p:sp>
-        <p:nvSpPr>
-          <p:cNvPr id="6" name="TextBox 5"/>
-          <p:cNvSpPr txBox="1"/>
-          <p:nvPr/>
-        </p:nvSpPr>
-        <p:spPr>
-          <a:xfrm>
-            <a:off x="6096000" y="914400"/>
-            <a:ext cx="3048000" cy="1015663"/>
-          </a:xfrm>
-          <a:prstGeom prst="rect">
-            <a:avLst/>
-          </a:prstGeom>
-          <a:noFill/>
-        </p:spPr>
-        <p:txBody>
-          <a:bodyPr wrap="square" rtlCol="0">
-            <a:spAutoFit/>
-          </a:bodyPr>
-          <a:lstStyle/>
-          <a:p>
-            <a:pPr algn="ctr"/>
-            <a:r>
-              <a:rPr lang="en-US" sz="6000" dirty="0" smtClean="0">
-                <a:latin typeface="Gill Sans MT" pitchFamily="34" charset="0"/>
-              </a:rPr>
-              <a:t>Best</a:t>
-            </a:r>
-            <a:endParaRPr lang="en-US" sz="6000" dirty="0">
-              <a:latin typeface="Gill Sans MT" pitchFamily="34" charset="0"/>
-            </a:endParaRPr>
-          </a:p>
-        </p:txBody>
-      </p:sp>
-      <p:pic>
-        <p:nvPicPr>
-          <p:cNvPr id="7" name="Picture 6"/>
-          <p:cNvPicPr>
-            <a:picLocks noChangeAspect="1"/>
-          </p:cNvPicPr>
-          <p:nvPr/>
-        </p:nvPicPr>
-        <p:blipFill rotWithShape="1">
-          <a:blip r:embed="rId2">
-            <a:extLst>
-              <a:ext uri="{28A0092B-C50C-407E-A947-70E740481C1C}">
-                <a14:useLocalDpi xmlns:a14="http://schemas.microsoft.com/office/drawing/2010/main" val="0"/>
-              </a:ext>
-            </a:extLst>
-          </a:blip>
-          <a:srcRect l="5397" t="23808" r="12677" b="22623"/>
-          <a:stretch/>
-        </p:blipFill>
-        <p:spPr>
-          <a:xfrm>
-            <a:off x="6358921" y="3062798"/>
-            <a:ext cx="2522157" cy="1236877"/>
-          </a:xfrm>
-          <a:prstGeom prst="rect">
-            <a:avLst/>
-          </a:prstGeom>
-        </p:spPr>
-      </p:pic>
-      <p:sp>
-        <p:nvSpPr>
-          <p:cNvPr id="11" name="TextBox 10"/>
-          <p:cNvSpPr txBox="1"/>
-          <p:nvPr/>
-        </p:nvSpPr>
-        <p:spPr>
-          <a:xfrm>
-            <a:off x="0" y="4808041"/>
-            <a:ext cx="3048000" cy="584775"/>
-          </a:xfrm>
-          <a:prstGeom prst="rect">
-            <a:avLst/>
-          </a:prstGeom>
-          <a:noFill/>
-        </p:spPr>
-        <p:txBody>
-          <a:bodyPr wrap="square" rtlCol="0">
-            <a:spAutoFit/>
-          </a:bodyPr>
-          <a:lstStyle/>
-          <a:p>
-            <a:pPr algn="ctr"/>
-            <a:r>
-              <a:rPr lang="en-US" sz="3200" dirty="0" smtClean="0">
-                <a:latin typeface="Gill Sans MT" pitchFamily="34" charset="0"/>
-              </a:rPr>
-              <a:t>Top News</a:t>
-            </a:r>
-            <a:endParaRPr lang="en-US" sz="3200" dirty="0">
-              <a:latin typeface="Gill Sans MT" pitchFamily="34" charset="0"/>
-            </a:endParaRPr>
-          </a:p>
-        </p:txBody>
-      </p:sp>
-      <p:sp>
-        <p:nvSpPr>
-          <p:cNvPr id="12" name="TextBox 11"/>
-          <p:cNvSpPr txBox="1"/>
-          <p:nvPr/>
-        </p:nvSpPr>
-        <p:spPr>
-          <a:xfrm>
-            <a:off x="3048000" y="4808041"/>
-            <a:ext cx="3048000" cy="584775"/>
-          </a:xfrm>
-          <a:prstGeom prst="rect">
-            <a:avLst/>
-          </a:prstGeom>
-          <a:noFill/>
-        </p:spPr>
-        <p:txBody>
-          <a:bodyPr wrap="square" rtlCol="0">
-            <a:spAutoFit/>
-          </a:bodyPr>
-          <a:lstStyle/>
-          <a:p>
-            <a:pPr algn="ctr"/>
-            <a:r>
-              <a:rPr lang="en-US" sz="3200" dirty="0" smtClean="0">
-                <a:latin typeface="Gill Sans MT" pitchFamily="34" charset="0"/>
-              </a:rPr>
-              <a:t>Personal</a:t>
-            </a:r>
-            <a:endParaRPr lang="en-US" sz="3200" dirty="0">
-              <a:latin typeface="Gill Sans MT" pitchFamily="34" charset="0"/>
-            </a:endParaRPr>
-          </a:p>
-        </p:txBody>
-      </p:sp>
-      <p:sp>
-        <p:nvSpPr>
-          <p:cNvPr id="13" name="TextBox 12"/>
-          <p:cNvSpPr txBox="1"/>
-          <p:nvPr/>
-        </p:nvSpPr>
-        <p:spPr>
-          <a:xfrm>
-            <a:off x="6096000" y="4800600"/>
-            <a:ext cx="3048000" cy="584775"/>
-          </a:xfrm>
-          <a:prstGeom prst="rect">
-            <a:avLst/>
-          </a:prstGeom>
-          <a:noFill/>
-        </p:spPr>
-        <p:txBody>
-          <a:bodyPr wrap="square" rtlCol="0">
-            <a:spAutoFit/>
-          </a:bodyPr>
-          <a:lstStyle/>
-          <a:p>
-            <a:pPr algn="ctr"/>
-            <a:r>
-              <a:rPr lang="en-US" sz="3200" dirty="0" smtClean="0">
-                <a:latin typeface="Gill Sans MT" pitchFamily="34" charset="0"/>
-              </a:rPr>
-              <a:t>Real-time</a:t>
-            </a:r>
-            <a:endParaRPr lang="en-US" sz="3200" dirty="0">
-              <a:latin typeface="Gill Sans MT" pitchFamily="34" charset="0"/>
-            </a:endParaRPr>
-          </a:p>
-        </p:txBody>
-      </p:sp>
-      <p:pic>
-        <p:nvPicPr>
-          <p:cNvPr id="14" name="Picture 13"/>
-          <p:cNvPicPr>
-            <a:picLocks noChangeAspect="1"/>
-          </p:cNvPicPr>
-          <p:nvPr/>
-        </p:nvPicPr>
-        <p:blipFill rotWithShape="1">
-          <a:blip r:embed="rId3">
-            <a:extLst>
-              <a:ext uri="{28A0092B-C50C-407E-A947-70E740481C1C}">
-                <a14:useLocalDpi xmlns:a14="http://schemas.microsoft.com/office/drawing/2010/main" val="0"/>
-              </a:ext>
-            </a:extLst>
-          </a:blip>
-          <a:srcRect l="66630" t="14876" b="56924"/>
-          <a:stretch/>
-        </p:blipFill>
-        <p:spPr>
-          <a:xfrm>
-            <a:off x="3593953" y="2714275"/>
-            <a:ext cx="1956094" cy="1933925"/>
-          </a:xfrm>
-          <a:prstGeom prst="rect">
-            <a:avLst/>
-          </a:prstGeom>
-        </p:spPr>
-      </p:pic>
-      <p:pic>
-        <p:nvPicPr>
-          <p:cNvPr id="15" name="Picture 14"/>
-          <p:cNvPicPr>
-            <a:picLocks noChangeAspect="1"/>
-          </p:cNvPicPr>
-          <p:nvPr/>
-        </p:nvPicPr>
-        <p:blipFill>
-          <a:blip r:embed="rId4">
-            <a:extLst>
-              <a:ext uri="{28A0092B-C50C-407E-A947-70E740481C1C}">
-                <a14:useLocalDpi xmlns:a14="http://schemas.microsoft.com/office/drawing/2010/main" val="0"/>
-              </a:ext>
-            </a:extLst>
-          </a:blip>
-          <a:stretch>
-            <a:fillRect/>
-          </a:stretch>
-        </p:blipFill>
-        <p:spPr>
-          <a:xfrm>
-            <a:off x="355573" y="2904407"/>
-            <a:ext cx="2336854" cy="1553658"/>
-          </a:xfrm>
-          <a:prstGeom prst="rect">
-            <a:avLst/>
-          </a:prstGeom>
-        </p:spPr>
-      </p:pic>
-    </p:spTree>
-    <p:extLst>
-      <p:ext uri="{BB962C8B-B14F-4D97-AF65-F5344CB8AC3E}">
-        <p14:creationId xmlns:p14="http://schemas.microsoft.com/office/powerpoint/2010/main" val="4281715429"/>
-      </p:ext>
-    </p:extLst>
-  </p:cSld>
-  <p:clrMapOvr>
-    <a:masterClrMapping/>
-  </p:clrMapOvr>
-  <p:timing>
-    <p:tnLst>
-      <p:par>
-        <p:cTn id="1" dur="indefinite" restart="never" nodeType="tmRoot">
-          <p:childTnLst>
-            <p:seq concurrent="1" nextAc="seek">
-              <p:cTn id="2" dur="indefinite" nodeType="mainSeq">
-                <p:childTnLst>
-                  <p:par>
-                    <p:cTn id="3" fill="hold">
-                      <p:stCondLst>
-                        <p:cond delay="indefinite"/>
-                      </p:stCondLst>
-                      <p:childTnLst>
-                        <p:par>
-                          <p:cTn id="4" fill="hold">
-                            <p:stCondLst>
-                              <p:cond delay="0"/>
-                            </p:stCondLst>
-                            <p:childTnLst>
-                              <p:par>
-                                <p:cTn id="5" presetID="1" presetClass="entr" presetSubtype="0" fill="hold" grpId="0" nodeType="clickEffect">
-                                  <p:stCondLst>
-                                    <p:cond delay="0"/>
-                                  </p:stCondLst>
-                                  <p:childTnLst>
-                                    <p:set>
-                                      <p:cBhvr>
-                                        <p:cTn id="6" dur="1" fill="hold">
-                                          <p:stCondLst>
-                                            <p:cond delay="0"/>
-                                          </p:stCondLst>
-                                        </p:cTn>
-                                        <p:tgtEl>
-                                          <p:spTgt spid="2"/>
-                                        </p:tgtEl>
-                                        <p:attrNameLst>
-                                          <p:attrName>style.visibility</p:attrName>
-                                        </p:attrNameLst>
-                                      </p:cBhvr>
-                                      <p:to>
-                                        <p:strVal val="visible"/>
-                                      </p:to>
-                                    </p:set>
-                                  </p:childTnLst>
-                                </p:cTn>
-                              </p:par>
-                              <p:par>
-                                <p:cTn id="7" presetID="1" presetClass="entr" presetSubtype="0" fill="hold" nodeType="withEffect">
-                                  <p:stCondLst>
-                                    <p:cond delay="0"/>
-                                  </p:stCondLst>
-                                  <p:childTnLst>
-                                    <p:set>
-                                      <p:cBhvr>
-                                        <p:cTn id="8" dur="1" fill="hold">
-                                          <p:stCondLst>
-                                            <p:cond delay="0"/>
-                                          </p:stCondLst>
-                                        </p:cTn>
-                                        <p:tgtEl>
-                                          <p:spTgt spid="15"/>
-                                        </p:tgtEl>
-                                        <p:attrNameLst>
-                                          <p:attrName>style.visibility</p:attrName>
-                                        </p:attrNameLst>
-                                      </p:cBhvr>
-                                      <p:to>
-                                        <p:strVal val="visible"/>
-                                      </p:to>
-                                    </p:set>
-                                  </p:childTnLst>
-                                </p:cTn>
-                              </p:par>
-                              <p:par>
-                                <p:cTn id="9" presetID="1" presetClass="entr" presetSubtype="0" fill="hold" grpId="0" nodeType="withEffect">
-                                  <p:stCondLst>
-                                    <p:cond delay="0"/>
-                                  </p:stCondLst>
-                                  <p:childTnLst>
-                                    <p:set>
-                                      <p:cBhvr>
-                                        <p:cTn id="10" dur="1" fill="hold">
-                                          <p:stCondLst>
-                                            <p:cond delay="0"/>
-                                          </p:stCondLst>
-                                        </p:cTn>
-                                        <p:tgtEl>
-                                          <p:spTgt spid="11"/>
-                                        </p:tgtEl>
-                                        <p:attrNameLst>
-                                          <p:attrName>style.visibility</p:attrName>
-                                        </p:attrNameLst>
-                                      </p:cBhvr>
-                                      <p:to>
-                                        <p:strVal val="visible"/>
-                                      </p:to>
-                                    </p:set>
-                                  </p:childTnLst>
-                                </p:cTn>
-                              </p:par>
-                            </p:childTnLst>
-                          </p:cTn>
-                        </p:par>
-                      </p:childTnLst>
-                    </p:cTn>
-                  </p:par>
-                  <p:par>
-                    <p:cTn id="11" fill="hold">
-                      <p:stCondLst>
-                        <p:cond delay="indefinite"/>
-                      </p:stCondLst>
-                      <p:childTnLst>
-                        <p:par>
-                          <p:cTn id="12" fill="hold">
-                            <p:stCondLst>
-                              <p:cond delay="0"/>
-                            </p:stCondLst>
-                            <p:childTnLst>
-                              <p:par>
-                                <p:cTn id="13" presetID="1" presetClass="entr" presetSubtype="0" fill="hold" grpId="0" nodeType="clickEffect">
-                                  <p:stCondLst>
-                                    <p:cond delay="0"/>
-                                  </p:stCondLst>
-                                  <p:childTnLst>
-                                    <p:set>
-                                      <p:cBhvr>
-                                        <p:cTn id="14" dur="1" fill="hold">
-                                          <p:stCondLst>
-                                            <p:cond delay="0"/>
-                                          </p:stCondLst>
-                                        </p:cTn>
-                                        <p:tgtEl>
-                                          <p:spTgt spid="5"/>
-                                        </p:tgtEl>
-                                        <p:attrNameLst>
-                                          <p:attrName>style.visibility</p:attrName>
-                                        </p:attrNameLst>
-                                      </p:cBhvr>
-                                      <p:to>
-                                        <p:strVal val="visible"/>
-                                      </p:to>
-                                    </p:set>
-                                  </p:childTnLst>
-                                </p:cTn>
-                              </p:par>
-                              <p:par>
-                                <p:cTn id="15" presetID="1" presetClass="entr" presetSubtype="0" fill="hold" nodeType="withEffect">
-                                  <p:stCondLst>
-                                    <p:cond delay="0"/>
-                                  </p:stCondLst>
-                                  <p:childTnLst>
-                                    <p:set>
-                                      <p:cBhvr>
-                                        <p:cTn id="16" dur="1" fill="hold">
-                                          <p:stCondLst>
-                                            <p:cond delay="0"/>
-                                          </p:stCondLst>
-                                        </p:cTn>
-                                        <p:tgtEl>
-                                          <p:spTgt spid="14"/>
-                                        </p:tgtEl>
-                                        <p:attrNameLst>
-                                          <p:attrName>style.visibility</p:attrName>
-                                        </p:attrNameLst>
-                                      </p:cBhvr>
-                                      <p:to>
-                                        <p:strVal val="visible"/>
-                                      </p:to>
-                                    </p:set>
-                                  </p:childTnLst>
-                                </p:cTn>
-                              </p:par>
-                              <p:par>
-                                <p:cTn id="17" presetID="1" presetClass="entr" presetSubtype="0" fill="hold" grpId="0" nodeType="withEffect">
-                                  <p:stCondLst>
-                                    <p:cond delay="0"/>
-                                  </p:stCondLst>
-                                  <p:childTnLst>
-                                    <p:set>
-                                      <p:cBhvr>
-                                        <p:cTn id="18" dur="1" fill="hold">
-                                          <p:stCondLst>
-                                            <p:cond delay="0"/>
-                                          </p:stCondLst>
-                                        </p:cTn>
-                                        <p:tgtEl>
-                                          <p:spTgt spid="12"/>
-                                        </p:tgtEl>
-                                        <p:attrNameLst>
-                                          <p:attrName>style.visibility</p:attrName>
-                                        </p:attrNameLst>
-                                      </p:cBhvr>
-                                      <p:to>
-                                        <p:strVal val="visible"/>
-                                      </p:to>
-                                    </p:set>
-                                  </p:childTnLst>
-                                </p:cTn>
-                              </p:par>
-                            </p:childTnLst>
-                          </p:cTn>
-                        </p:par>
-                      </p:childTnLst>
-                    </p:cTn>
-                  </p:par>
-                  <p:par>
-                    <p:cTn id="19" fill="hold">
-                      <p:stCondLst>
-                        <p:cond delay="indefinite"/>
-                      </p:stCondLst>
-                      <p:childTnLst>
-                        <p:par>
-                          <p:cTn id="20" fill="hold">
-                            <p:stCondLst>
-                              <p:cond delay="0"/>
-                            </p:stCondLst>
-                            <p:childTnLst>
-                              <p:par>
-                                <p:cTn id="21" presetID="1" presetClass="entr" presetSubtype="0" fill="hold" grpId="0" nodeType="clickEffect">
-                                  <p:stCondLst>
-                                    <p:cond delay="0"/>
-                                  </p:stCondLst>
-                                  <p:childTnLst>
-                                    <p:set>
-                                      <p:cBhvr>
-                                        <p:cTn id="22" dur="1" fill="hold">
-                                          <p:stCondLst>
-                                            <p:cond delay="0"/>
-                                          </p:stCondLst>
-                                        </p:cTn>
-                                        <p:tgtEl>
-                                          <p:spTgt spid="6"/>
-                                        </p:tgtEl>
-                                        <p:attrNameLst>
-                                          <p:attrName>style.visibility</p:attrName>
-                                        </p:attrNameLst>
-                                      </p:cBhvr>
-                                      <p:to>
-                                        <p:strVal val="visible"/>
-                                      </p:to>
-                                    </p:set>
-                                  </p:childTnLst>
-                                </p:cTn>
-                              </p:par>
-                              <p:par>
-                                <p:cTn id="23" presetID="1" presetClass="entr" presetSubtype="0" fill="hold" nodeType="withEffect">
-                                  <p:stCondLst>
-                                    <p:cond delay="0"/>
-                                  </p:stCondLst>
-                                  <p:childTnLst>
-                                    <p:set>
-                                      <p:cBhvr>
-                                        <p:cTn id="24" dur="1" fill="hold">
-                                          <p:stCondLst>
-                                            <p:cond delay="0"/>
-                                          </p:stCondLst>
-                                        </p:cTn>
-                                        <p:tgtEl>
-                                          <p:spTgt spid="7"/>
-                                        </p:tgtEl>
-                                        <p:attrNameLst>
-                                          <p:attrName>style.visibility</p:attrName>
-                                        </p:attrNameLst>
-                                      </p:cBhvr>
-                                      <p:to>
-                                        <p:strVal val="visible"/>
-                                      </p:to>
-                                    </p:set>
-                                  </p:childTnLst>
-                                </p:cTn>
-                              </p:par>
-                              <p:par>
-                                <p:cTn id="25" presetID="1" presetClass="entr" presetSubtype="0" fill="hold" grpId="0" nodeType="withEffect">
-                                  <p:stCondLst>
-                                    <p:cond delay="0"/>
-                                  </p:stCondLst>
-                                  <p:childTnLst>
-                                    <p:set>
-                                      <p:cBhvr>
-                                        <p:cTn id="26" dur="1" fill="hold">
-                                          <p:stCondLst>
-                                            <p:cond delay="0"/>
-                                          </p:stCondLst>
-                                        </p:cTn>
-                                        <p:tgtEl>
-                                          <p:spTgt spid="13"/>
-                                        </p:tgtEl>
-                                        <p:attrNameLst>
-                                          <p:attrName>style.visibility</p:attrName>
-                                        </p:attrNameLst>
-                                      </p:cBhvr>
-                                      <p:to>
-                                        <p:strVal val="visible"/>
-                                      </p:to>
-                                    </p:set>
-                                  </p:childTnLst>
-                                </p:cTn>
-                              </p:par>
-                            </p:childTnLst>
-                          </p:cTn>
-                        </p:par>
-                      </p:childTnLst>
-                    </p:cTn>
-                  </p:par>
-                </p:childTnLst>
-              </p:cTn>
-              <p:prevCondLst>
-                <p:cond evt="onPrev" delay="0">
-                  <p:tgtEl>
-                    <p:sldTgt/>
-                  </p:tgtEl>
-                </p:cond>
-              </p:prevCondLst>
-              <p:nextCondLst>
-                <p:cond evt="onNext" delay="0">
-                  <p:tgtEl>
-                    <p:sldTgt/>
-                  </p:tgtEl>
-                </p:cond>
-              </p:nextCondLst>
-            </p:seq>
-          </p:childTnLst>
-        </p:cTn>
-      </p:par>
-    </p:tnLst>
-    <p:bldLst>
-      <p:bldP spid="2" grpId="0"/>
-      <p:bldP spid="5" grpId="0"/>
-      <p:bldP spid="6" grpId="0"/>
-      <p:bldP spid="11" grpId="0"/>
-      <p:bldP spid="12" grpId="0"/>
-      <p:bldP spid="13" grpId="0"/>
-    </p:bldLst>
-  </p:timing>
-</p:sld>
-</file>
-
-<file path=ppt/slides/slide68.xml><?xml version="1.0" encoding="utf-8"?>
-<p:sld xmlns:a="http://schemas.openxmlformats.org/drawingml/2006/main" xmlns:r="http://schemas.openxmlformats.org/officeDocument/2006/relationships" xmlns:p="http://schemas.openxmlformats.org/presentationml/2006/main">
-  <p:cSld>
-    <p:spTree>
-      <p:nvGrpSpPr>
-        <p:cNvPr id="1" name=""/>
-        <p:cNvGrpSpPr/>
-        <p:nvPr/>
-      </p:nvGrpSpPr>
-      <p:grpSpPr>
-        <a:xfrm>
-          <a:off x="0" y="0"/>
-          <a:ext cx="0" cy="0"/>
-          <a:chOff x="0" y="0"/>
-          <a:chExt cx="0" cy="0"/>
-        </a:xfrm>
-      </p:grpSpPr>
-      <p:pic>
-        <p:nvPicPr>
-          <p:cNvPr id="2" name="Picture 1"/>
-          <p:cNvPicPr>
-            <a:picLocks noChangeAspect="1"/>
-          </p:cNvPicPr>
-          <p:nvPr/>
-        </p:nvPicPr>
-        <p:blipFill>
-          <a:blip r:embed="rId2">
-            <a:extLst>
-              <a:ext uri="{28A0092B-C50C-407E-A947-70E740481C1C}">
-                <a14:useLocalDpi xmlns:a14="http://schemas.microsoft.com/office/drawing/2010/main" val="0"/>
-              </a:ext>
-            </a:extLst>
-          </a:blip>
-          <a:stretch>
-            <a:fillRect/>
-          </a:stretch>
-        </p:blipFill>
-        <p:spPr>
-          <a:xfrm>
-            <a:off x="1641050" y="0"/>
-            <a:ext cx="5861900" cy="6858000"/>
-          </a:xfrm>
-          <a:prstGeom prst="rect">
-            <a:avLst/>
-          </a:prstGeom>
-        </p:spPr>
-      </p:pic>
-      <p:sp>
-        <p:nvSpPr>
-          <p:cNvPr id="3" name="Slide Number Placeholder 2"/>
-          <p:cNvSpPr>
-            <a:spLocks noGrp="1"/>
-          </p:cNvSpPr>
-          <p:nvPr>
-            <p:ph type="sldNum" sz="quarter" idx="12"/>
-          </p:nvPr>
-        </p:nvSpPr>
-        <p:spPr/>
-        <p:txBody>
-          <a:bodyPr/>
-          <a:lstStyle/>
-          <a:p>
-            <a:fld id="{318BA781-E589-4C61-8C8B-F5ECA1300D5B}" type="slidenum">
-              <a:rPr lang="en-US" smtClean="0"/>
-              <a:t>68</a:t>
-            </a:fld>
-            <a:endParaRPr lang="en-US"/>
-          </a:p>
-        </p:txBody>
-      </p:sp>
-    </p:spTree>
-    <p:extLst>
-      <p:ext uri="{BB962C8B-B14F-4D97-AF65-F5344CB8AC3E}">
-        <p14:creationId xmlns:p14="http://schemas.microsoft.com/office/powerpoint/2010/main" val="144402820"/>
-      </p:ext>
-    </p:extLst>
-  </p:cSld>
-  <p:clrMapOvr>
-    <a:masterClrMapping/>
-  </p:clrMapOvr>
-  <p:timing>
-    <p:tnLst>
-      <p:par>
-        <p:cTn id="1" dur="indefinite" restart="never" nodeType="tmRoot"/>
-      </p:par>
-    </p:tnLst>
-  </p:timing>
-</p:sld>
-</file>
-
-<file path=ppt/slides/slide69.xml><?xml version="1.0" encoding="utf-8"?>
-<p:sld xmlns:a="http://schemas.openxmlformats.org/drawingml/2006/main" xmlns:r="http://schemas.openxmlformats.org/officeDocument/2006/relationships" xmlns:p="http://schemas.openxmlformats.org/presentationml/2006/main">
-  <p:cSld>
-    <p:spTree>
-      <p:nvGrpSpPr>
-        <p:cNvPr id="1" name=""/>
-        <p:cNvGrpSpPr/>
-        <p:nvPr/>
-      </p:nvGrpSpPr>
-      <p:grpSpPr>
-        <a:xfrm>
-          <a:off x="0" y="0"/>
-          <a:ext cx="0" cy="0"/>
-          <a:chOff x="0" y="0"/>
-          <a:chExt cx="0" cy="0"/>
-        </a:xfrm>
-      </p:grpSpPr>
-      <p:sp>
-        <p:nvSpPr>
-          <p:cNvPr id="2" name="TextBox 1"/>
-          <p:cNvSpPr txBox="1"/>
-          <p:nvPr/>
-        </p:nvSpPr>
-        <p:spPr>
-          <a:xfrm>
-            <a:off x="304800" y="1981200"/>
-            <a:ext cx="8686800" cy="2585323"/>
-          </a:xfrm>
-          <a:prstGeom prst="rect">
-            <a:avLst/>
-          </a:prstGeom>
-          <a:noFill/>
-        </p:spPr>
-        <p:txBody>
-          <a:bodyPr wrap="square" rtlCol="0">
-            <a:spAutoFit/>
-          </a:bodyPr>
-          <a:lstStyle/>
-          <a:p>
-            <a:pPr marL="857250" indent="-857250">
-              <a:buClr>
-                <a:srgbClr val="92D050"/>
-              </a:buClr>
-              <a:buFont typeface="Wingdings" pitchFamily="2" charset="2"/>
-              <a:buChar char="ü"/>
-            </a:pPr>
-            <a:r>
-              <a:rPr lang="en-US" sz="5400" dirty="0" smtClean="0">
-                <a:latin typeface="Gill Sans MT" pitchFamily="34" charset="0"/>
-              </a:rPr>
-              <a:t>We had the data</a:t>
-            </a:r>
-          </a:p>
-          <a:p>
-            <a:pPr marL="857250" indent="-857250">
-              <a:buClr>
-                <a:srgbClr val="92D050"/>
-              </a:buClr>
-              <a:buFont typeface="Wingdings" pitchFamily="2" charset="2"/>
-              <a:buChar char="ü"/>
-            </a:pPr>
-            <a:r>
-              <a:rPr lang="en-US" sz="5400" dirty="0" smtClean="0">
-                <a:latin typeface="Gill Sans MT" pitchFamily="34" charset="0"/>
-              </a:rPr>
-              <a:t>We had the content</a:t>
-            </a:r>
-          </a:p>
-          <a:p>
-            <a:pPr marL="857250" indent="-857250">
-              <a:buClr>
-                <a:schemeClr val="accent3"/>
-              </a:buClr>
-              <a:buFont typeface="Gill Sans MT" pitchFamily="34" charset="0"/>
-              <a:buChar char="X"/>
-            </a:pPr>
-            <a:r>
-              <a:rPr lang="en-US" sz="5400" dirty="0" smtClean="0">
-                <a:latin typeface="Gill Sans MT" pitchFamily="34" charset="0"/>
-              </a:rPr>
-              <a:t>We didn’t connect the dots</a:t>
-            </a:r>
-            <a:endParaRPr lang="en-US" sz="5400" dirty="0">
-              <a:latin typeface="Gill Sans MT" pitchFamily="34" charset="0"/>
-            </a:endParaRPr>
-          </a:p>
-        </p:txBody>
-      </p:sp>
-      <p:sp>
-        <p:nvSpPr>
-          <p:cNvPr id="3" name="Slide Number Placeholder 2"/>
-          <p:cNvSpPr>
-            <a:spLocks noGrp="1"/>
-          </p:cNvSpPr>
-          <p:nvPr>
-            <p:ph type="sldNum" sz="quarter" idx="12"/>
-          </p:nvPr>
-        </p:nvSpPr>
-        <p:spPr/>
-        <p:txBody>
-          <a:bodyPr/>
-          <a:lstStyle/>
-          <a:p>
-            <a:fld id="{318BA781-E589-4C61-8C8B-F5ECA1300D5B}" type="slidenum">
-              <a:rPr lang="en-US" smtClean="0"/>
-              <a:t>69</a:t>
-            </a:fld>
-            <a:endParaRPr lang="en-US"/>
-          </a:p>
-        </p:txBody>
-      </p:sp>
-    </p:spTree>
-    <p:extLst>
-      <p:ext uri="{BB962C8B-B14F-4D97-AF65-F5344CB8AC3E}">
-        <p14:creationId xmlns:p14="http://schemas.microsoft.com/office/powerpoint/2010/main" val="1499489265"/>
-      </p:ext>
-    </p:extLst>
-  </p:cSld>
-  <p:clrMapOvr>
-    <a:masterClrMapping/>
-  </p:clrMapOvr>
-  <p:timing>
-    <p:tnLst>
-      <p:par>
-        <p:cTn id="1" dur="indefinite" restart="never" nodeType="tmRoot">
-          <p:childTnLst>
-            <p:seq concurrent="1" nextAc="seek">
-              <p:cTn id="2" dur="indefinite" nodeType="mainSeq">
-                <p:childTnLst>
-                  <p:par>
-                    <p:cTn id="3" fill="hold">
-                      <p:stCondLst>
-                        <p:cond delay="indefinite"/>
-                      </p:stCondLst>
-                      <p:childTnLst>
-                        <p:par>
-                          <p:cTn id="4" fill="hold">
-                            <p:stCondLst>
-                              <p:cond delay="0"/>
-                            </p:stCondLst>
-                            <p:childTnLst>
-                              <p:par>
-                                <p:cTn id="5" presetID="1" presetClass="entr" presetSubtype="0" fill="hold" nodeType="clickEffect">
-                                  <p:stCondLst>
-                                    <p:cond delay="0"/>
-                                  </p:stCondLst>
-                                  <p:childTnLst>
-                                    <p:set>
-                                      <p:cBhvr>
-                                        <p:cTn id="6" dur="1" fill="hold">
-                                          <p:stCondLst>
-                                            <p:cond delay="0"/>
-                                          </p:stCondLst>
-                                        </p:cTn>
-                                        <p:tgtEl>
-                                          <p:spTgt spid="2">
-                                            <p:txEl>
-                                              <p:pRg st="0" end="0"/>
-                                            </p:txEl>
-                                          </p:spTgt>
-                                        </p:tgtEl>
-                                        <p:attrNameLst>
-                                          <p:attrName>style.visibility</p:attrName>
-                                        </p:attrNameLst>
-                                      </p:cBhvr>
-                                      <p:to>
-                                        <p:strVal val="visible"/>
-                                      </p:to>
-                                    </p:set>
-                                  </p:childTnLst>
-                                </p:cTn>
-                              </p:par>
-                            </p:childTnLst>
-                          </p:cTn>
-                        </p:par>
-                      </p:childTnLst>
-                    </p:cTn>
-                  </p:par>
-                  <p:par>
-                    <p:cTn id="7" fill="hold">
-                      <p:stCondLst>
-                        <p:cond delay="indefinite"/>
-                      </p:stCondLst>
-                      <p:childTnLst>
-                        <p:par>
-                          <p:cTn id="8" fill="hold">
-                            <p:stCondLst>
-                              <p:cond delay="0"/>
-                            </p:stCondLst>
-                            <p:childTnLst>
-                              <p:par>
-                                <p:cTn id="9" presetID="1" presetClass="entr" presetSubtype="0" fill="hold" nodeType="clickEffect">
-                                  <p:stCondLst>
-                                    <p:cond delay="0"/>
-                                  </p:stCondLst>
-                                  <p:childTnLst>
-                                    <p:set>
-                                      <p:cBhvr>
-                                        <p:cTn id="10" dur="1" fill="hold">
-                                          <p:stCondLst>
-                                            <p:cond delay="0"/>
-                                          </p:stCondLst>
-                                        </p:cTn>
-                                        <p:tgtEl>
-                                          <p:spTgt spid="2">
-                                            <p:txEl>
-                                              <p:pRg st="1" end="1"/>
-                                            </p:txEl>
-                                          </p:spTgt>
-                                        </p:tgtEl>
-                                        <p:attrNameLst>
-                                          <p:attrName>style.visibility</p:attrName>
-                                        </p:attrNameLst>
-                                      </p:cBhvr>
-                                      <p:to>
-                                        <p:strVal val="visible"/>
-                                      </p:to>
-                                    </p:set>
-                                  </p:childTnLst>
-                                </p:cTn>
-                              </p:par>
-                            </p:childTnLst>
-                          </p:cTn>
-                        </p:par>
-                      </p:childTnLst>
-                    </p:cTn>
-                  </p:par>
-                  <p:par>
-                    <p:cTn id="11" fill="hold">
-                      <p:stCondLst>
-                        <p:cond delay="indefinite"/>
-                      </p:stCondLst>
-                      <p:childTnLst>
-                        <p:par>
-                          <p:cTn id="12" fill="hold">
-                            <p:stCondLst>
-                              <p:cond delay="0"/>
-                            </p:stCondLst>
-                            <p:childTnLst>
-                              <p:par>
-                                <p:cTn id="13" presetID="1" presetClass="entr" presetSubtype="0" fill="hold" nodeType="clickEffect">
-                                  <p:stCondLst>
-                                    <p:cond delay="0"/>
-                                  </p:stCondLst>
-                                  <p:childTnLst>
-                                    <p:set>
-                                      <p:cBhvr>
-                                        <p:cTn id="14" dur="1" fill="hold">
-                                          <p:stCondLst>
-                                            <p:cond delay="0"/>
-                                          </p:stCondLst>
-                                        </p:cTn>
-                                        <p:tgtEl>
-                                          <p:spTgt spid="2">
-                                            <p:txEl>
-                                              <p:pRg st="2" end="2"/>
-                                            </p:txEl>
-                                          </p:spTgt>
-                                        </p:tgtEl>
-                                        <p:attrNameLst>
-                                          <p:attrName>style.visibility</p:attrName>
-                                        </p:attrNameLst>
-                                      </p:cBhvr>
-                                      <p:to>
-                                        <p:strVal val="visible"/>
-                                      </p:to>
-                                    </p:set>
-                                  </p:childTnLst>
-                                </p:cTn>
-                              </p:par>
-                            </p:childTnLst>
-                          </p:cTn>
-                        </p:par>
-                      </p:childTnLst>
-                    </p:cTn>
-                  </p:par>
-                </p:childTnLst>
-              </p:cTn>
-              <p:prevCondLst>
-                <p:cond evt="onPrev" delay="0">
-                  <p:tgtEl>
-                    <p:sldTgt/>
-                  </p:tgtEl>
-                </p:cond>
-              </p:prevCondLst>
-              <p:nextCondLst>
-                <p:cond evt="onNext" delay="0">
-                  <p:tgtEl>
-                    <p:sldTgt/>
-                  </p:tgtEl>
-                </p:cond>
-              </p:nextCondLst>
-            </p:seq>
-          </p:childTnLst>
-        </p:cTn>
       </p:par>
     </p:tnLst>
   </p:timing>
@@ -55265,244 +52618,6 @@
     <p:bldLst>
       <p:bldP spid="20" grpId="0"/>
     </p:bldLst>
-  </p:timing>
-</p:sld>
-</file>
-
-<file path=ppt/slides/slide70.xml><?xml version="1.0" encoding="utf-8"?>
-<p:sld xmlns:a="http://schemas.openxmlformats.org/drawingml/2006/main" xmlns:r="http://schemas.openxmlformats.org/officeDocument/2006/relationships" xmlns:p="http://schemas.openxmlformats.org/presentationml/2006/main">
-  <p:cSld>
-    <p:spTree>
-      <p:nvGrpSpPr>
-        <p:cNvPr id="1" name=""/>
-        <p:cNvGrpSpPr/>
-        <p:nvPr/>
-      </p:nvGrpSpPr>
-      <p:grpSpPr>
-        <a:xfrm>
-          <a:off x="0" y="0"/>
-          <a:ext cx="0" cy="0"/>
-          <a:chOff x="0" y="0"/>
-          <a:chExt cx="0" cy="0"/>
-        </a:xfrm>
-      </p:grpSpPr>
-      <p:sp>
-        <p:nvSpPr>
-          <p:cNvPr id="2" name="TextBox 1"/>
-          <p:cNvSpPr txBox="1"/>
-          <p:nvPr/>
-        </p:nvSpPr>
-        <p:spPr>
-          <a:xfrm>
-            <a:off x="0" y="76200"/>
-            <a:ext cx="9144000" cy="7017306"/>
-          </a:xfrm>
-          <a:prstGeom prst="rect">
-            <a:avLst/>
-          </a:prstGeom>
-          <a:noFill/>
-        </p:spPr>
-        <p:txBody>
-          <a:bodyPr wrap="square" rtlCol="0">
-            <a:spAutoFit/>
-          </a:bodyPr>
-          <a:lstStyle/>
-          <a:p>
-            <a:pPr algn="ctr"/>
-            <a:r>
-              <a:rPr lang="en-US" sz="45000" dirty="0" smtClean="0">
-                <a:latin typeface="Book Antiqua" pitchFamily="18" charset="0"/>
-              </a:rPr>
-              <a:t>?</a:t>
-            </a:r>
-            <a:endParaRPr lang="en-US" sz="45000" dirty="0">
-              <a:latin typeface="Book Antiqua" pitchFamily="18" charset="0"/>
-            </a:endParaRPr>
-          </a:p>
-        </p:txBody>
-      </p:sp>
-    </p:spTree>
-    <p:extLst>
-      <p:ext uri="{BB962C8B-B14F-4D97-AF65-F5344CB8AC3E}">
-        <p14:creationId xmlns:p14="http://schemas.microsoft.com/office/powerpoint/2010/main" val="3616936793"/>
-      </p:ext>
-    </p:extLst>
-  </p:cSld>
-  <p:clrMapOvr>
-    <a:masterClrMapping/>
-  </p:clrMapOvr>
-  <p:timing>
-    <p:tnLst>
-      <p:par>
-        <p:cTn id="1" dur="indefinite" restart="never" nodeType="tmRoot"/>
-      </p:par>
-    </p:tnLst>
-  </p:timing>
-</p:sld>
-</file>
-
-<file path=ppt/slides/slide71.xml><?xml version="1.0" encoding="utf-8"?>
-<p:sld xmlns:a="http://schemas.openxmlformats.org/drawingml/2006/main" xmlns:r="http://schemas.openxmlformats.org/officeDocument/2006/relationships" xmlns:p="http://schemas.openxmlformats.org/presentationml/2006/main">
-  <p:cSld>
-    <p:spTree>
-      <p:nvGrpSpPr>
-        <p:cNvPr id="1" name=""/>
-        <p:cNvGrpSpPr/>
-        <p:nvPr/>
-      </p:nvGrpSpPr>
-      <p:grpSpPr>
-        <a:xfrm>
-          <a:off x="0" y="0"/>
-          <a:ext cx="0" cy="0"/>
-          <a:chOff x="0" y="0"/>
-          <a:chExt cx="0" cy="0"/>
-        </a:xfrm>
-      </p:grpSpPr>
-      <p:pic>
-        <p:nvPicPr>
-          <p:cNvPr id="4" name="Content Placeholder 5"/>
-          <p:cNvPicPr>
-            <a:picLocks noChangeAspect="1"/>
-          </p:cNvPicPr>
-          <p:nvPr/>
-        </p:nvPicPr>
-        <p:blipFill rotWithShape="1">
-          <a:blip r:embed="rId3" cstate="print">
-            <a:extLst>
-              <a:ext uri="{28A0092B-C50C-407E-A947-70E740481C1C}">
-                <a14:useLocalDpi xmlns:a14="http://schemas.microsoft.com/office/drawing/2010/main" val="0"/>
-              </a:ext>
-            </a:extLst>
-          </a:blip>
-          <a:srcRect t="7574" b="3184"/>
-          <a:stretch/>
-        </p:blipFill>
-        <p:spPr>
-          <a:xfrm>
-            <a:off x="762000" y="-1"/>
-            <a:ext cx="7696200" cy="6868133"/>
-          </a:xfrm>
-          <a:prstGeom prst="rect">
-            <a:avLst/>
-          </a:prstGeom>
-        </p:spPr>
-      </p:pic>
-      <p:sp>
-        <p:nvSpPr>
-          <p:cNvPr id="2" name="Rectangle 1"/>
-          <p:cNvSpPr/>
-          <p:nvPr/>
-        </p:nvSpPr>
-        <p:spPr>
-          <a:xfrm>
-            <a:off x="762000" y="0"/>
-            <a:ext cx="7696200" cy="6858000"/>
-          </a:xfrm>
-          <a:prstGeom prst="rect">
-            <a:avLst/>
-          </a:prstGeom>
-          <a:solidFill>
-            <a:srgbClr val="000000">
-              <a:alpha val="80000"/>
-            </a:srgbClr>
-          </a:solidFill>
-          <a:ln>
-            <a:noFill/>
-          </a:ln>
-        </p:spPr>
-        <p:style>
-          <a:lnRef idx="2">
-            <a:schemeClr val="accent1">
-              <a:shade val="50000"/>
-            </a:schemeClr>
-          </a:lnRef>
-          <a:fillRef idx="1">
-            <a:schemeClr val="accent1"/>
-          </a:fillRef>
-          <a:effectRef idx="0">
-            <a:schemeClr val="accent1"/>
-          </a:effectRef>
-          <a:fontRef idx="minor">
-            <a:schemeClr val="lt1"/>
-          </a:fontRef>
-        </p:style>
-        <p:txBody>
-          <a:bodyPr rtlCol="0" anchor="ctr"/>
-          <a:lstStyle/>
-          <a:p>
-            <a:pPr algn="ctr"/>
-            <a:endParaRPr lang="en-US"/>
-          </a:p>
-        </p:txBody>
-      </p:sp>
-      <p:sp>
-        <p:nvSpPr>
-          <p:cNvPr id="5" name="TextBox 4"/>
-          <p:cNvSpPr txBox="1"/>
-          <p:nvPr/>
-        </p:nvSpPr>
-        <p:spPr>
-          <a:xfrm>
-            <a:off x="1524000" y="2252008"/>
-            <a:ext cx="6248400" cy="1938992"/>
-          </a:xfrm>
-          <a:prstGeom prst="rect">
-            <a:avLst/>
-          </a:prstGeom>
-        </p:spPr>
-        <p:style>
-          <a:lnRef idx="2">
-            <a:schemeClr val="accent3">
-              <a:shade val="50000"/>
-            </a:schemeClr>
-          </a:lnRef>
-          <a:fillRef idx="1">
-            <a:schemeClr val="accent3"/>
-          </a:fillRef>
-          <a:effectRef idx="0">
-            <a:schemeClr val="accent3"/>
-          </a:effectRef>
-          <a:fontRef idx="minor">
-            <a:schemeClr val="lt1"/>
-          </a:fontRef>
-        </p:style>
-        <p:txBody>
-          <a:bodyPr wrap="square" rtlCol="0">
-            <a:spAutoFit/>
-          </a:bodyPr>
-          <a:lstStyle/>
-          <a:p>
-            <a:r>
-              <a:rPr lang="en-US" sz="4000" dirty="0" smtClean="0"/>
-              <a:t>Half a second delay caused a 25% drop in traffic.</a:t>
-            </a:r>
-          </a:p>
-          <a:p>
-            <a:pPr algn="r"/>
-            <a:r>
-              <a:rPr lang="en-US" sz="4000" dirty="0" smtClean="0"/>
-              <a:t>- Google</a:t>
-            </a:r>
-            <a:endParaRPr lang="en-US" sz="4000" dirty="0"/>
-          </a:p>
-        </p:txBody>
-      </p:sp>
-    </p:spTree>
-    <p:extLst>
-      <p:ext uri="{BB962C8B-B14F-4D97-AF65-F5344CB8AC3E}">
-        <p14:creationId xmlns:p14="http://schemas.microsoft.com/office/powerpoint/2010/main" val="3063557929"/>
-      </p:ext>
-    </p:extLst>
-  </p:cSld>
-  <p:clrMapOvr>
-    <a:masterClrMapping/>
-  </p:clrMapOvr>
-  <p:timing>
-    <p:tnLst>
-      <p:par>
-        <p:cTn id="1" dur="indefinite" restart="never" nodeType="tmRoot"/>
-      </p:par>
-    </p:tnLst>
   </p:timing>
 </p:sld>
 </file>

</xml_diff>